<commit_message>
lec 8 small fixes
</commit_message>
<xml_diff>
--- a/Lectures/Lecture8.pptx
+++ b/Lectures/Lecture8.pptx
@@ -313,7 +313,7 @@
           <a:p>
             <a:fld id="{CBA08D16-15DC-4E25-BDC3-F25146157B16}" type="datetimeFigureOut">
               <a:rPr lang="ru-RU" smtClean="0"/>
-              <a:t>10.11.2022</a:t>
+              <a:t>08.11.2023</a:t>
             </a:fld>
             <a:endParaRPr lang="ru-RU"/>
           </a:p>
@@ -983,7 +983,7 @@
           <a:p>
             <a:fld id="{FCEC8293-DB51-454A-BE81-EC8FCB31EBA2}" type="datetime1">
               <a:rPr lang="ru-RU" smtClean="0"/>
-              <a:t>10.11.2022</a:t>
+              <a:t>08.11.2023</a:t>
             </a:fld>
             <a:endParaRPr lang="ru-RU"/>
           </a:p>
@@ -1157,7 +1157,7 @@
           <a:p>
             <a:fld id="{241C87B1-1C35-4DBD-BC18-2BC72E776603}" type="datetime1">
               <a:rPr lang="ru-RU" smtClean="0"/>
-              <a:t>10.11.2022</a:t>
+              <a:t>08.11.2023</a:t>
             </a:fld>
             <a:endParaRPr lang="ru-RU"/>
           </a:p>
@@ -1341,7 +1341,7 @@
           <a:p>
             <a:fld id="{3134C275-26C0-42CD-9111-9ADE65922AF9}" type="datetime1">
               <a:rPr lang="ru-RU" smtClean="0"/>
-              <a:t>10.11.2022</a:t>
+              <a:t>08.11.2023</a:t>
             </a:fld>
             <a:endParaRPr lang="ru-RU"/>
           </a:p>
@@ -1552,7 +1552,7 @@
           <a:p>
             <a:fld id="{C1A9A50B-C350-45F5-8AAB-ADB9E670AF2E}" type="datetime1">
               <a:rPr lang="ru-RU" smtClean="0"/>
-              <a:t>10.11.2022</a:t>
+              <a:t>08.11.2023</a:t>
             </a:fld>
             <a:endParaRPr lang="ru-RU"/>
           </a:p>
@@ -1802,7 +1802,7 @@
           <a:p>
             <a:fld id="{089688C9-348F-42F9-B6C0-5990DDE0C5B2}" type="datetime1">
               <a:rPr lang="ru-RU" smtClean="0"/>
-              <a:t>10.11.2022</a:t>
+              <a:t>08.11.2023</a:t>
             </a:fld>
             <a:endParaRPr lang="ru-RU"/>
           </a:p>
@@ -2038,7 +2038,7 @@
           <a:p>
             <a:fld id="{684AFD8F-6DD9-4AD3-A505-FDC3F5C5F3F6}" type="datetime1">
               <a:rPr lang="ru-RU" smtClean="0"/>
-              <a:t>10.11.2022</a:t>
+              <a:t>08.11.2023</a:t>
             </a:fld>
             <a:endParaRPr lang="ru-RU"/>
           </a:p>
@@ -2409,7 +2409,7 @@
           <a:p>
             <a:fld id="{63551EFE-4D02-45EB-A747-8B6F047B5AA0}" type="datetime1">
               <a:rPr lang="ru-RU" smtClean="0"/>
-              <a:t>10.11.2022</a:t>
+              <a:t>08.11.2023</a:t>
             </a:fld>
             <a:endParaRPr lang="ru-RU"/>
           </a:p>
@@ -2531,7 +2531,7 @@
           <a:p>
             <a:fld id="{813A9F34-E5CD-4B8F-AA9E-889C84372B20}" type="datetime1">
               <a:rPr lang="ru-RU" smtClean="0"/>
-              <a:t>10.11.2022</a:t>
+              <a:t>08.11.2023</a:t>
             </a:fld>
             <a:endParaRPr lang="ru-RU"/>
           </a:p>
@@ -2630,7 +2630,7 @@
           <a:p>
             <a:fld id="{51224D22-9B29-44A6-8E82-95FC492DEDC1}" type="datetime1">
               <a:rPr lang="ru-RU" smtClean="0"/>
-              <a:t>10.11.2022</a:t>
+              <a:t>08.11.2023</a:t>
             </a:fld>
             <a:endParaRPr lang="ru-RU"/>
           </a:p>
@@ -2911,7 +2911,7 @@
           <a:p>
             <a:fld id="{91D1034F-4441-48A1-BDC0-25EA1022324A}" type="datetime1">
               <a:rPr lang="ru-RU" smtClean="0"/>
-              <a:t>10.11.2022</a:t>
+              <a:t>08.11.2023</a:t>
             </a:fld>
             <a:endParaRPr lang="ru-RU"/>
           </a:p>
@@ -3168,7 +3168,7 @@
           <a:p>
             <a:fld id="{B0FFDE79-B627-473B-AE17-4C65BD2495F7}" type="datetime1">
               <a:rPr lang="ru-RU" smtClean="0"/>
-              <a:t>10.11.2022</a:t>
+              <a:t>08.11.2023</a:t>
             </a:fld>
             <a:endParaRPr lang="ru-RU"/>
           </a:p>
@@ -3385,7 +3385,7 @@
           <a:p>
             <a:fld id="{11CA537A-1B8C-47BA-9BA6-7CE3FAFDA8BE}" type="datetime1">
               <a:rPr lang="ru-RU" smtClean="0"/>
-              <a:t>10.11.2022</a:t>
+              <a:t>08.11.2023</a:t>
             </a:fld>
             <a:endParaRPr lang="ru-RU"/>
           </a:p>
@@ -3899,8 +3899,8 @@
               <a:t>202</a:t>
             </a:r>
             <a:r>
-              <a:rPr lang="en-US" dirty="0" smtClean="0"/>
-              <a:t>2</a:t>
+              <a:rPr lang="en-US" dirty="0"/>
+              <a:t>3</a:t>
             </a:r>
             <a:endParaRPr lang="ru-RU" dirty="0"/>
           </a:p>
@@ -3960,15 +3960,7 @@
           <a:p>
             <a:r>
               <a:rPr lang="ru-RU" dirty="0" smtClean="0"/>
-              <a:t>Построение </a:t>
-            </a:r>
-            <a:r>
-              <a:rPr lang="en-US" dirty="0" smtClean="0"/>
-              <a:t>CPA </a:t>
-            </a:r>
-            <a:r>
-              <a:rPr lang="ru-RU" dirty="0" smtClean="0"/>
-              <a:t>шифров из семантически стойких шифров</a:t>
+              <a:t>Вспоминаем гибридную конструкцию</a:t>
             </a:r>
             <a:endParaRPr lang="ru-RU" dirty="0"/>
           </a:p>
@@ -4392,6 +4384,9 @@
                   <m:oMath xmlns:m="http://schemas.openxmlformats.org/officeDocument/2006/math">
                     <m:r>
                       <a:rPr lang="en-US" b="0" i="1" smtClean="0">
+                        <a:solidFill>
+                          <a:srgbClr val="FF0000"/>
+                        </a:solidFill>
                         <a:latin typeface="Cambria Math" panose="02040503050406030204" pitchFamily="18" charset="0"/>
                       </a:rPr>
                       <m:t>𝑥</m:t>
@@ -4722,6 +4717,9 @@
                     </m:r>
                     <m:r>
                       <a:rPr lang="en-US" b="0" i="1" smtClean="0">
+                        <a:solidFill>
+                          <a:srgbClr val="FF0000"/>
+                        </a:solidFill>
                         <a:latin typeface="Cambria Math" panose="02040503050406030204" pitchFamily="18" charset="0"/>
                       </a:rPr>
                       <m:t>𝑥</m:t>
@@ -4945,6 +4943,9 @@
                       <m:e>
                         <m:r>
                           <a:rPr lang="en-US" b="0" i="1" smtClean="0">
+                            <a:solidFill>
+                              <a:srgbClr val="FF0000"/>
+                            </a:solidFill>
                             <a:latin typeface="Cambria Math" panose="02040503050406030204" pitchFamily="18" charset="0"/>
                           </a:rPr>
                           <m:t>𝑥</m:t>
@@ -5114,7 +5115,10 @@
                           <m:t>,</m:t>
                         </m:r>
                         <m:r>
-                          <a:rPr lang="en-US" i="1">
+                          <a:rPr lang="en-US" i="1" smtClean="0">
+                            <a:solidFill>
+                              <a:srgbClr val="FF0000"/>
+                            </a:solidFill>
                             <a:latin typeface="Cambria Math" panose="02040503050406030204" pitchFamily="18" charset="0"/>
                           </a:rPr>
                           <m:t>𝑥</m:t>
@@ -6088,8 +6092,8 @@
             </a:p>
           </p:txBody>
         </p:sp>
-        <mc:AlternateContent xmlns:mc="http://schemas.openxmlformats.org/markup-compatibility/2006" xmlns:a14="http://schemas.microsoft.com/office/drawing/2010/main">
-          <mc:Choice Requires="a14">
+        <mc:AlternateContent xmlns:mc="http://schemas.openxmlformats.org/markup-compatibility/2006">
+          <mc:Choice xmlns:a14="http://schemas.microsoft.com/office/drawing/2010/main" Requires="a14">
             <p:sp>
               <p:nvSpPr>
                 <p:cNvPr id="15" name="Text Box 14"/>
@@ -6254,6 +6258,9 @@
                       </m:r>
                       <m:r>
                         <a:rPr lang="en-US" sz="2000" b="0" i="1" smtClean="0">
+                          <a:solidFill>
+                            <a:srgbClr val="FF0000"/>
+                          </a:solidFill>
                           <a:latin typeface="Cambria Math" panose="02040503050406030204" pitchFamily="18" charset="0"/>
                         </a:rPr>
                         <m:t>𝑥</m:t>
@@ -6271,7 +6278,7 @@
               </p:txBody>
             </p:sp>
           </mc:Choice>
-          <mc:Fallback xmlns="">
+          <mc:Fallback>
             <p:sp>
               <p:nvSpPr>
                 <p:cNvPr id="15" name="Text Box 14"/>
@@ -6291,7 +6298,7 @@
                 <a:blipFill>
                   <a:blip r:embed="rId6"/>
                   <a:stretch>
-                    <a:fillRect b="-20238"/>
+                    <a:fillRect b="-21687"/>
                   </a:stretch>
                 </a:blipFill>
                 <a:ln w="9525">
@@ -6486,8 +6493,8 @@
           </p:sp>
         </mc:Fallback>
       </mc:AlternateContent>
-      <mc:AlternateContent xmlns:mc="http://schemas.openxmlformats.org/markup-compatibility/2006" xmlns:a14="http://schemas.microsoft.com/office/drawing/2010/main">
-        <mc:Choice Requires="a14">
+      <mc:AlternateContent xmlns:mc="http://schemas.openxmlformats.org/markup-compatibility/2006">
+        <mc:Choice xmlns:a14="http://schemas.microsoft.com/office/drawing/2010/main" Requires="a14">
           <p:sp>
             <p:nvSpPr>
               <p:cNvPr id="24" name="Text Box 13"/>
@@ -6564,6 +6571,9 @@
                       <m:sSubPr>
                         <m:ctrlPr>
                           <a:rPr lang="en-US" sz="1600" b="0" i="1" smtClean="0">
+                            <a:solidFill>
+                              <a:srgbClr val="FF0000"/>
+                            </a:solidFill>
                             <a:latin typeface="Cambria Math" panose="02040503050406030204" pitchFamily="18" charset="0"/>
                           </a:rPr>
                         </m:ctrlPr>
@@ -6571,6 +6581,9 @@
                       <m:e>
                         <m:r>
                           <a:rPr lang="en-US" sz="1600" b="0" i="1" smtClean="0">
+                            <a:solidFill>
+                              <a:srgbClr val="FF0000"/>
+                            </a:solidFill>
                             <a:latin typeface="Cambria Math" panose="02040503050406030204" pitchFamily="18" charset="0"/>
                           </a:rPr>
                           <m:t>𝑥</m:t>
@@ -6579,6 +6592,9 @@
                       <m:sub>
                         <m:r>
                           <a:rPr lang="en-US" sz="1600" b="0" i="1" smtClean="0">
+                            <a:solidFill>
+                              <a:srgbClr val="FF0000"/>
+                            </a:solidFill>
                             <a:latin typeface="Cambria Math" panose="02040503050406030204" pitchFamily="18" charset="0"/>
                           </a:rPr>
                           <m:t>𝑖</m:t>
@@ -6751,7 +6767,7 @@
             </p:txBody>
           </p:sp>
         </mc:Choice>
-        <mc:Fallback xmlns="">
+        <mc:Fallback>
           <p:sp>
             <p:nvSpPr>
               <p:cNvPr id="24" name="Text Box 13"/>
@@ -6768,7 +6784,7 @@
               <a:prstGeom prst="rect">
                 <a:avLst/>
               </a:prstGeom>
-              <a:blipFill rotWithShape="0">
+              <a:blipFill>
                 <a:blip r:embed="rId9"/>
                 <a:stretch>
                   <a:fillRect l="-2027" b="-16854"/>
@@ -7065,17 +7081,10 @@
           <a:lstStyle/>
           <a:p>
             <a:r>
-              <a:rPr lang="ru-RU" dirty="0"/>
-              <a:t>Построение </a:t>
+              <a:rPr lang="ru-RU" dirty="0" smtClean="0"/>
+              <a:t>Стойкость гибридной конструкции</a:t>
             </a:r>
-            <a:r>
-              <a:rPr lang="en-US" dirty="0"/>
-              <a:t>CPA </a:t>
-            </a:r>
-            <a:r>
-              <a:rPr lang="ru-RU" dirty="0"/>
-              <a:t>шифров из семантически стойких шифров</a:t>
-            </a:r>
+            <a:endParaRPr lang="ru-RU" dirty="0"/>
           </a:p>
         </p:txBody>
       </p:sp>
@@ -7780,8 +7789,8 @@
           </a:p>
         </p:txBody>
       </p:sp>
-      <mc:AlternateContent xmlns:mc="http://schemas.openxmlformats.org/markup-compatibility/2006" xmlns:a14="http://schemas.microsoft.com/office/drawing/2010/main">
-        <mc:Choice Requires="a14">
+      <mc:AlternateContent xmlns:mc="http://schemas.openxmlformats.org/markup-compatibility/2006">
+        <mc:Choice xmlns:a14="http://schemas.microsoft.com/office/drawing/2010/main" Requires="a14">
           <p:sp>
             <p:nvSpPr>
               <p:cNvPr id="3" name="Объект 2"/>
@@ -7831,7 +7840,11 @@
                   <a:t> на </a:t>
                 </a:r>
                 <a:r>
-                  <a:rPr lang="en-US" dirty="0" smtClean="0"/>
+                  <a:rPr lang="en-US" dirty="0" smtClean="0">
+                    <a:solidFill>
+                      <a:srgbClr val="00B050"/>
+                    </a:solidFill>
+                  </a:rPr>
                   <a:t>nonce</a:t>
                 </a:r>
                 <a:r>
@@ -8345,7 +8358,10 @@
                       <m:t>=[</m:t>
                     </m:r>
                     <m:r>
-                      <a:rPr lang="en-US" i="1">
+                      <a:rPr lang="en-US" i="1" smtClean="0">
+                        <a:solidFill>
+                          <a:srgbClr val="00B050"/>
+                        </a:solidFill>
                         <a:latin typeface="Cambria Math" panose="02040503050406030204" pitchFamily="18" charset="0"/>
                       </a:rPr>
                       <m:t>𝑥</m:t>
@@ -8675,7 +8691,10 @@
                           <m:t>,</m:t>
                         </m:r>
                         <m:r>
-                          <a:rPr lang="en-US" i="1">
+                          <a:rPr lang="en-US" i="1" smtClean="0">
+                            <a:solidFill>
+                              <a:srgbClr val="00B050"/>
+                            </a:solidFill>
                             <a:latin typeface="Cambria Math" panose="02040503050406030204" pitchFamily="18" charset="0"/>
                           </a:rPr>
                           <m:t>𝑥</m:t>
@@ -8781,7 +8800,7 @@
             </p:txBody>
           </p:sp>
         </mc:Choice>
-        <mc:Fallback xmlns="">
+        <mc:Fallback>
           <p:sp>
             <p:nvSpPr>
               <p:cNvPr id="3" name="Объект 2"/>
@@ -8793,7 +8812,7 @@
               </p:nvPr>
             </p:nvSpPr>
             <p:spPr>
-              <a:blipFill rotWithShape="0">
+              <a:blipFill>
                 <a:blip r:embed="rId2"/>
                 <a:stretch>
                   <a:fillRect l="-1043" t="-2101"/>
@@ -9698,8 +9717,12 @@
           <a:lstStyle/>
           <a:p>
             <a:r>
+              <a:rPr lang="ru-RU" dirty="0" smtClean="0"/>
+              <a:t>Вспоминаем </a:t>
+            </a:r>
+            <a:r>
               <a:rPr lang="ru-RU" dirty="0" err="1" smtClean="0"/>
-              <a:t>Рандомизированный</a:t>
+              <a:t>рандомизированный</a:t>
             </a:r>
             <a:r>
               <a:rPr lang="ru-RU" dirty="0" smtClean="0"/>
@@ -9707,7 +9730,15 @@
             </a:r>
             <a:r>
               <a:rPr lang="en-US" dirty="0" smtClean="0"/>
-              <a:t>CRT </a:t>
+              <a:t>CT</a:t>
+            </a:r>
+            <a:r>
+              <a:rPr lang="en-US" dirty="0"/>
+              <a:t>R</a:t>
+            </a:r>
+            <a:r>
+              <a:rPr lang="en-US" dirty="0" smtClean="0"/>
+              <a:t> </a:t>
             </a:r>
             <a:r>
               <a:rPr lang="ru-RU" dirty="0" smtClean="0"/>
@@ -9717,8 +9748,8 @@
           </a:p>
         </p:txBody>
       </p:sp>
-      <mc:AlternateContent xmlns:mc="http://schemas.openxmlformats.org/markup-compatibility/2006" xmlns:a14="http://schemas.microsoft.com/office/drawing/2010/main">
-        <mc:Choice Requires="a14">
+      <mc:AlternateContent xmlns:mc="http://schemas.openxmlformats.org/markup-compatibility/2006">
+        <mc:Choice xmlns:a14="http://schemas.microsoft.com/office/drawing/2010/main" Requires="a14">
           <p:sp>
             <p:nvSpPr>
               <p:cNvPr id="3" name="Объект 2"/>
@@ -10316,6 +10347,9 @@
                       <m:e>
                         <m:r>
                           <a:rPr lang="en-US" b="0" i="1" smtClean="0">
+                            <a:solidFill>
+                              <a:srgbClr val="FF0000"/>
+                            </a:solidFill>
                             <a:latin typeface="Cambria Math" panose="02040503050406030204" pitchFamily="18" charset="0"/>
                           </a:rPr>
                           <m:t>𝑥</m:t>
@@ -10396,7 +10430,7 @@
             </p:txBody>
           </p:sp>
         </mc:Choice>
-        <mc:Fallback xmlns="">
+        <mc:Fallback>
           <p:sp>
             <p:nvSpPr>
               <p:cNvPr id="3" name="Объект 2"/>
@@ -11344,8 +11378,8 @@
             </a:p>
           </p:txBody>
         </p:sp>
-        <mc:AlternateContent xmlns:mc="http://schemas.openxmlformats.org/markup-compatibility/2006" xmlns:a14="http://schemas.microsoft.com/office/drawing/2010/main">
-          <mc:Choice Requires="a14">
+        <mc:AlternateContent xmlns:mc="http://schemas.openxmlformats.org/markup-compatibility/2006">
+          <mc:Choice xmlns:a14="http://schemas.microsoft.com/office/drawing/2010/main" Requires="a14">
             <p:sp>
               <p:nvSpPr>
                 <p:cNvPr id="15" name="Text Box 14"/>
@@ -11392,6 +11426,9 @@
                             <m:sSubPr>
                               <m:ctrlPr>
                                 <a:rPr lang="en-US" sz="2000" b="0" i="1" smtClean="0">
+                                  <a:solidFill>
+                                    <a:srgbClr val="FF0000"/>
+                                  </a:solidFill>
                                   <a:latin typeface="Cambria Math" panose="02040503050406030204" pitchFamily="18" charset="0"/>
                                 </a:rPr>
                               </m:ctrlPr>
@@ -11399,6 +11436,9 @@
                             <m:e>
                               <m:r>
                                 <a:rPr lang="en-US" sz="2000" b="0" i="1" smtClean="0">
+                                  <a:solidFill>
+                                    <a:srgbClr val="FF0000"/>
+                                  </a:solidFill>
                                   <a:latin typeface="Cambria Math" panose="02040503050406030204" pitchFamily="18" charset="0"/>
                                 </a:rPr>
                                 <m:t>𝑥</m:t>
@@ -11407,6 +11447,9 @@
                             <m:sub>
                               <m:r>
                                 <a:rPr lang="en-US" sz="2000" b="0" i="1" smtClean="0">
+                                  <a:solidFill>
+                                    <a:srgbClr val="FF0000"/>
+                                  </a:solidFill>
                                   <a:latin typeface="Cambria Math" panose="02040503050406030204" pitchFamily="18" charset="0"/>
                                 </a:rPr>
                                 <m:t>𝑖</m:t>
@@ -11463,7 +11506,7 @@
               </p:txBody>
             </p:sp>
           </mc:Choice>
-          <mc:Fallback xmlns="">
+          <mc:Fallback>
             <p:sp>
               <p:nvSpPr>
                 <p:cNvPr id="15" name="Text Box 14"/>
@@ -11483,7 +11526,7 @@
                 <a:blipFill>
                   <a:blip r:embed="rId6"/>
                   <a:stretch>
-                    <a:fillRect t="-7576" r="-3493" b="-25758"/>
+                    <a:fillRect t="-9091" r="-3043" b="-25758"/>
                   </a:stretch>
                 </a:blipFill>
                 <a:ln w="9525">
@@ -11678,8 +11721,8 @@
           </p:sp>
         </mc:Fallback>
       </mc:AlternateContent>
-      <mc:AlternateContent xmlns:mc="http://schemas.openxmlformats.org/markup-compatibility/2006" xmlns:a14="http://schemas.microsoft.com/office/drawing/2010/main">
-        <mc:Choice Requires="a14">
+      <mc:AlternateContent xmlns:mc="http://schemas.openxmlformats.org/markup-compatibility/2006">
+        <mc:Choice xmlns:a14="http://schemas.microsoft.com/office/drawing/2010/main" Requires="a14">
           <p:sp>
             <p:nvSpPr>
               <p:cNvPr id="24" name="Text Box 13"/>
@@ -11756,6 +11799,9 @@
                       <m:sSubPr>
                         <m:ctrlPr>
                           <a:rPr lang="en-US" sz="1600" b="0" i="1" smtClean="0">
+                            <a:solidFill>
+                              <a:srgbClr val="FF0000"/>
+                            </a:solidFill>
                             <a:latin typeface="Cambria Math" panose="02040503050406030204" pitchFamily="18" charset="0"/>
                           </a:rPr>
                         </m:ctrlPr>
@@ -11763,6 +11809,9 @@
                       <m:e>
                         <m:r>
                           <a:rPr lang="en-US" sz="1600" b="0" i="1" smtClean="0">
+                            <a:solidFill>
+                              <a:srgbClr val="FF0000"/>
+                            </a:solidFill>
                             <a:latin typeface="Cambria Math" panose="02040503050406030204" pitchFamily="18" charset="0"/>
                           </a:rPr>
                           <m:t>𝑥</m:t>
@@ -11771,6 +11820,9 @@
                       <m:sub>
                         <m:r>
                           <a:rPr lang="en-US" sz="1600" b="0" i="1" smtClean="0">
+                            <a:solidFill>
+                              <a:srgbClr val="FF0000"/>
+                            </a:solidFill>
                             <a:latin typeface="Cambria Math" panose="02040503050406030204" pitchFamily="18" charset="0"/>
                           </a:rPr>
                           <m:t>𝑖</m:t>
@@ -12156,7 +12208,7 @@
             </p:txBody>
           </p:sp>
         </mc:Choice>
-        <mc:Fallback xmlns="">
+        <mc:Fallback>
           <p:sp>
             <p:nvSpPr>
               <p:cNvPr id="24" name="Text Box 13"/>
@@ -12173,7 +12225,7 @@
               <a:prstGeom prst="rect">
                 <a:avLst/>
               </a:prstGeom>
-              <a:blipFill rotWithShape="0">
+              <a:blipFill>
                 <a:blip r:embed="rId9"/>
                 <a:stretch>
                   <a:fillRect l="-1548"/>
@@ -12470,11 +12522,19 @@
           <a:lstStyle/>
           <a:p>
             <a:r>
-              <a:rPr lang="ru-RU" dirty="0" err="1"/>
-              <a:t>Рандомизированный</a:t>
+              <a:rPr lang="ru-RU" dirty="0" smtClean="0"/>
+              <a:t>Стойкость </a:t>
             </a:r>
             <a:r>
-              <a:rPr lang="ru-RU" dirty="0"/>
+              <a:rPr lang="ru-RU" dirty="0" err="1" smtClean="0"/>
+              <a:t>р</a:t>
+            </a:r>
+            <a:r>
+              <a:rPr lang="ru-RU" dirty="0" err="1" smtClean="0"/>
+              <a:t>андомизированного</a:t>
+            </a:r>
+            <a:r>
+              <a:rPr lang="ru-RU" dirty="0" smtClean="0"/>
               <a:t> </a:t>
             </a:r>
             <a:r>
@@ -12482,9 +12542,10 @@
               <a:t>CRT </a:t>
             </a:r>
             <a:r>
-              <a:rPr lang="ru-RU" dirty="0"/>
-              <a:t>режим</a:t>
+              <a:rPr lang="ru-RU" dirty="0" smtClean="0"/>
+              <a:t>режима</a:t>
             </a:r>
+            <a:endParaRPr lang="ru-RU" dirty="0"/>
           </a:p>
         </p:txBody>
       </p:sp>
@@ -13001,8 +13062,8 @@
           </a:p>
         </p:txBody>
       </p:sp>
-      <mc:AlternateContent xmlns:mc="http://schemas.openxmlformats.org/markup-compatibility/2006" xmlns:a14="http://schemas.microsoft.com/office/drawing/2010/main">
-        <mc:Choice Requires="a14">
+      <mc:AlternateContent xmlns:mc="http://schemas.openxmlformats.org/markup-compatibility/2006">
+        <mc:Choice xmlns:a14="http://schemas.microsoft.com/office/drawing/2010/main" Requires="a14">
           <p:sp>
             <p:nvSpPr>
               <p:cNvPr id="3" name="Объект 2"/>
@@ -13028,11 +13089,31 @@
                 </a:r>
                 <a:r>
                   <a:rPr lang="ru-RU" dirty="0" smtClean="0"/>
-                  <a:t>режим, заменив случайный элемент на </a:t>
+                  <a:t>режим, заменив </a:t>
+                </a:r>
+                <a:r>
+                  <a:rPr lang="ru-RU" dirty="0" smtClean="0">
+                    <a:solidFill>
+                      <a:srgbClr val="FF0000"/>
+                    </a:solidFill>
+                  </a:rPr>
+                  <a:t>случайный элемент </a:t>
+                </a:r>
+                <a:r>
+                  <a:rPr lang="ru-RU" dirty="0" smtClean="0"/>
+                  <a:t>на </a:t>
+                </a:r>
+                <a:r>
+                  <a:rPr lang="en-US" dirty="0" smtClean="0">
+                    <a:solidFill>
+                      <a:srgbClr val="00B050"/>
+                    </a:solidFill>
+                  </a:rPr>
+                  <a:t>nonce</a:t>
                 </a:r>
                 <a:r>
                   <a:rPr lang="en-US" dirty="0" smtClean="0"/>
-                  <a:t>nonce?</a:t>
+                  <a:t>?</a:t>
                 </a:r>
               </a:p>
               <a:p>
@@ -13041,7 +13122,11 @@
                   <a:t>Нет! В отличии от гибридной конструкции, где нам была важна уникальность </a:t>
                 </a:r>
                 <a:r>
-                  <a:rPr lang="en-US" dirty="0" smtClean="0"/>
+                  <a:rPr lang="en-US" dirty="0" smtClean="0">
+                    <a:solidFill>
+                      <a:srgbClr val="00B050"/>
+                    </a:solidFill>
+                  </a:rPr>
                   <a:t>nonce</a:t>
                 </a:r>
                 <a:r>
@@ -13124,7 +13209,11 @@
                   <a:t> на </a:t>
                 </a:r>
                 <a:r>
-                  <a:rPr lang="en-US" dirty="0" smtClean="0"/>
+                  <a:rPr lang="en-US" dirty="0" smtClean="0">
+                    <a:solidFill>
+                      <a:srgbClr val="00B050"/>
+                    </a:solidFill>
+                  </a:rPr>
                   <a:t>nonce</a:t>
                 </a:r>
                 <a:r>
@@ -13474,7 +13563,7 @@
             </p:txBody>
           </p:sp>
         </mc:Choice>
-        <mc:Fallback xmlns="">
+        <mc:Fallback>
           <p:sp>
             <p:nvSpPr>
               <p:cNvPr id="3" name="Объект 2"/>
@@ -13486,7 +13575,7 @@
               </p:nvPr>
             </p:nvSpPr>
             <p:spPr>
-              <a:blipFill rotWithShape="0">
+              <a:blipFill>
                 <a:blip r:embed="rId2"/>
                 <a:stretch>
                   <a:fillRect l="-928" t="-2101" r="-1159"/>
@@ -14244,8 +14333,8 @@
           </a:p>
         </p:txBody>
       </p:sp>
-      <mc:AlternateContent xmlns:mc="http://schemas.openxmlformats.org/markup-compatibility/2006" xmlns:a14="http://schemas.microsoft.com/office/drawing/2010/main">
-        <mc:Choice Requires="a14">
+      <mc:AlternateContent xmlns:mc="http://schemas.openxmlformats.org/markup-compatibility/2006">
+        <mc:Choice xmlns:a14="http://schemas.microsoft.com/office/drawing/2010/main" Requires="a14">
           <p:sp>
             <p:nvSpPr>
               <p:cNvPr id="3" name="Объект 2"/>
@@ -14266,8 +14355,16 @@
                   <a:t>Введём </a:t>
                 </a:r>
                 <a:r>
+                  <a:rPr lang="en-US" dirty="0" smtClean="0">
+                    <a:solidFill>
+                      <a:srgbClr val="00B050"/>
+                    </a:solidFill>
+                  </a:rPr>
+                  <a:t>nonce</a:t>
+                </a:r>
+                <a:r>
                   <a:rPr lang="en-US" dirty="0" smtClean="0"/>
-                  <a:t>nonce </a:t>
+                  <a:t> </a:t>
                 </a:r>
                 <a:r>
                   <a:rPr lang="ru-RU" dirty="0" smtClean="0"/>
@@ -14348,8 +14445,16 @@
                   <a:t> </a:t>
                 </a:r>
                 <a:r>
+                  <a:rPr lang="en-US" dirty="0" smtClean="0">
+                    <a:solidFill>
+                      <a:srgbClr val="00B050"/>
+                    </a:solidFill>
+                  </a:rPr>
+                  <a:t>nonce</a:t>
+                </a:r>
+                <a:r>
                   <a:rPr lang="en-US" dirty="0" smtClean="0"/>
-                  <a:t>nonce, </a:t>
+                  <a:t>, </a:t>
                 </a:r>
                 <a14:m>
                   <m:oMath xmlns:m="http://schemas.openxmlformats.org/officeDocument/2006/math">
@@ -14408,8 +14513,16 @@
                   <a:t>Т.е. два различных </a:t>
                 </a:r>
                 <a:r>
+                  <a:rPr lang="en-US" dirty="0" smtClean="0">
+                    <a:solidFill>
+                      <a:srgbClr val="00B050"/>
+                    </a:solidFill>
+                  </a:rPr>
+                  <a:t>nonce</a:t>
+                </a:r>
+                <a:r>
                   <a:rPr lang="en-US" dirty="0" smtClean="0"/>
-                  <a:t>nonce </a:t>
+                  <a:t> </a:t>
                 </a:r>
                 <a14:m>
                   <m:oMath xmlns:m="http://schemas.openxmlformats.org/officeDocument/2006/math">
@@ -14812,7 +14925,7 @@
             </p:txBody>
           </p:sp>
         </mc:Choice>
-        <mc:Fallback xmlns="">
+        <mc:Fallback>
           <p:sp>
             <p:nvSpPr>
               <p:cNvPr id="3" name="Объект 2"/>
@@ -19725,8 +19838,8 @@
           </p:sp>
         </mc:Fallback>
       </mc:AlternateContent>
-      <mc:AlternateContent xmlns:mc="http://schemas.openxmlformats.org/markup-compatibility/2006" xmlns:a14="http://schemas.microsoft.com/office/drawing/2010/main">
-        <mc:Choice Requires="a14">
+      <mc:AlternateContent xmlns:mc="http://schemas.openxmlformats.org/markup-compatibility/2006">
+        <mc:Choice xmlns:a14="http://schemas.microsoft.com/office/drawing/2010/main" Requires="a14">
           <p:sp>
             <p:nvSpPr>
               <p:cNvPr id="24" name="Text Box 13"/>
@@ -19800,13 +19913,19 @@
                 <a14:m>
                   <m:oMath xmlns:m="http://schemas.openxmlformats.org/officeDocument/2006/math">
                     <m:r>
-                      <a:rPr lang="en-US" sz="1600" i="1">
+                      <a:rPr lang="en-US" sz="1600" i="1" smtClean="0">
+                        <a:solidFill>
+                          <a:srgbClr val="FF0000"/>
+                        </a:solidFill>
                         <a:latin typeface="Cambria Math" panose="02040503050406030204" pitchFamily="18" charset="0"/>
                       </a:rPr>
                       <m:t>𝑐</m:t>
                     </m:r>
                     <m:r>
                       <a:rPr lang="en-US" sz="1600" b="0" i="1" smtClean="0">
+                        <a:solidFill>
+                          <a:srgbClr val="FF0000"/>
+                        </a:solidFill>
                         <a:latin typeface="Cambria Math" panose="02040503050406030204" pitchFamily="18" charset="0"/>
                       </a:rPr>
                       <m:t>[0]</m:t>
@@ -20072,7 +20191,7 @@
             </p:txBody>
           </p:sp>
         </mc:Choice>
-        <mc:Fallback xmlns="">
+        <mc:Fallback>
           <p:sp>
             <p:nvSpPr>
               <p:cNvPr id="24" name="Text Box 13"/>
@@ -20089,7 +20208,7 @@
               <a:prstGeom prst="rect">
                 <a:avLst/>
               </a:prstGeom>
-              <a:blipFill rotWithShape="0">
+              <a:blipFill>
                 <a:blip r:embed="rId9"/>
                 <a:stretch>
                   <a:fillRect l="-2105" b="-797"/>
@@ -21011,8 +21130,8 @@
           </a:p>
         </p:txBody>
       </p:sp>
-      <mc:AlternateContent xmlns:mc="http://schemas.openxmlformats.org/markup-compatibility/2006" xmlns:a14="http://schemas.microsoft.com/office/drawing/2010/main">
-        <mc:Choice Requires="a14">
+      <mc:AlternateContent xmlns:mc="http://schemas.openxmlformats.org/markup-compatibility/2006">
+        <mc:Choice xmlns:a14="http://schemas.microsoft.com/office/drawing/2010/main" Requires="a14">
           <p:sp>
             <p:nvSpPr>
               <p:cNvPr id="3" name="Объект 2"/>
@@ -21042,11 +21161,31 @@
                 </a:r>
                 <a:r>
                   <a:rPr lang="ru-RU" dirty="0"/>
-                  <a:t>, заменив случайный элемент на </a:t>
+                  <a:t>, заменив </a:t>
+                </a:r>
+                <a:r>
+                  <a:rPr lang="ru-RU" dirty="0">
+                    <a:solidFill>
+                      <a:srgbClr val="FF0000"/>
+                    </a:solidFill>
+                  </a:rPr>
+                  <a:t>случайный элемент </a:t>
+                </a:r>
+                <a:r>
+                  <a:rPr lang="ru-RU" dirty="0"/>
+                  <a:t>на </a:t>
+                </a:r>
+                <a:r>
+                  <a:rPr lang="en-US" dirty="0">
+                    <a:solidFill>
+                      <a:srgbClr val="FF0000"/>
+                    </a:solidFill>
+                  </a:rPr>
+                  <a:t>nonce</a:t>
                 </a:r>
                 <a:r>
                   <a:rPr lang="en-US" dirty="0"/>
-                  <a:t>nonce?</a:t>
+                  <a:t>?</a:t>
                 </a:r>
               </a:p>
               <a:p>
@@ -21475,7 +21614,7 @@
             </p:txBody>
           </p:sp>
         </mc:Choice>
-        <mc:Fallback xmlns="">
+        <mc:Fallback>
           <p:sp>
             <p:nvSpPr>
               <p:cNvPr id="3" name="Объект 2"/>
@@ -21487,7 +21626,7 @@
               </p:nvPr>
             </p:nvSpPr>
             <p:spPr>
-              <a:blipFill rotWithShape="0">
+              <a:blipFill>
                 <a:blip r:embed="rId2"/>
                 <a:stretch>
                   <a:fillRect l="-928" t="-2101"/>
@@ -21592,8 +21731,8 @@
           </a:p>
         </p:txBody>
       </p:sp>
-      <mc:AlternateContent xmlns:mc="http://schemas.openxmlformats.org/markup-compatibility/2006" xmlns:a14="http://schemas.microsoft.com/office/drawing/2010/main">
-        <mc:Choice Requires="a14">
+      <mc:AlternateContent xmlns:mc="http://schemas.openxmlformats.org/markup-compatibility/2006">
+        <mc:Choice xmlns:a14="http://schemas.microsoft.com/office/drawing/2010/main" Requires="a14">
           <p:sp>
             <p:nvSpPr>
               <p:cNvPr id="3" name="Объект 2"/>
@@ -21611,19 +21750,47 @@
               <a:p>
                 <a:r>
                   <a:rPr lang="ru-RU" dirty="0" smtClean="0"/>
-                  <a:t>Идея – заменить случайный </a:t>
+                  <a:t>Идея – заменить </a:t>
+                </a:r>
+                <a:r>
+                  <a:rPr lang="ru-RU" dirty="0" smtClean="0">
+                    <a:solidFill>
+                      <a:srgbClr val="FF0000"/>
+                    </a:solidFill>
+                  </a:rPr>
+                  <a:t>случайный </a:t>
+                </a:r>
+                <a:r>
+                  <a:rPr lang="en-US" dirty="0" smtClean="0">
+                    <a:solidFill>
+                      <a:srgbClr val="FF0000"/>
+                    </a:solidFill>
+                  </a:rPr>
+                  <a:t>IV</a:t>
+                </a:r>
+                <a:r>
+                  <a:rPr lang="ru-RU" dirty="0" smtClean="0">
+                    <a:solidFill>
+                      <a:srgbClr val="FF0000"/>
+                    </a:solidFill>
+                  </a:rPr>
+                  <a:t> </a:t>
+                </a:r>
+                <a:r>
+                  <a:rPr lang="ru-RU" dirty="0" smtClean="0"/>
+                  <a:t>на псевдослучайный, полученный из </a:t>
+                </a:r>
+                <a:r>
+                  <a:rPr lang="en-US" dirty="0" smtClean="0">
+                    <a:solidFill>
+                      <a:srgbClr val="00B050"/>
+                    </a:solidFill>
+                  </a:rPr>
+                  <a:t>nonce</a:t>
                 </a:r>
                 <a:r>
                   <a:rPr lang="en-US" dirty="0" smtClean="0"/>
-                  <a:t>IV</a:t>
-                </a:r>
-                <a:r>
-                  <a:rPr lang="ru-RU" dirty="0" smtClean="0"/>
-                  <a:t> на псевдослучайный, полученный из </a:t>
-                </a:r>
-                <a:r>
-                  <a:rPr lang="en-US" dirty="0" smtClean="0"/>
-                  <a:t>nonce </a:t>
+                  <a:t> </a:t>
                 </a:r>
                 <a:r>
                   <a:rPr lang="ru-RU" dirty="0" smtClean="0"/>
@@ -22001,6 +22168,9 @@
                     </m:r>
                     <m:r>
                       <a:rPr lang="en-US" b="0" i="1" smtClean="0">
+                        <a:solidFill>
+                          <a:srgbClr val="00B050"/>
+                        </a:solidFill>
                         <a:latin typeface="Cambria Math" panose="02040503050406030204" pitchFamily="18" charset="0"/>
                       </a:rPr>
                       <m:t>𝑛</m:t>
@@ -22022,7 +22192,7 @@
             </p:txBody>
           </p:sp>
         </mc:Choice>
-        <mc:Fallback xmlns="">
+        <mc:Fallback>
           <p:sp>
             <p:nvSpPr>
               <p:cNvPr id="3" name="Объект 2"/>
@@ -22034,7 +22204,7 @@
               </p:nvPr>
             </p:nvSpPr>
             <p:spPr>
-              <a:blipFill rotWithShape="0">
+              <a:blipFill>
                 <a:blip r:embed="rId2"/>
                 <a:stretch>
                   <a:fillRect l="-928" t="-2101" r="-1159"/>
@@ -23479,13 +23649,29 @@
           <a:p>
             <a:r>
               <a:rPr lang="ru-RU" dirty="0" smtClean="0"/>
-              <a:t>Подход 1 – рандомизация функции </a:t>
+              <a:t>Подход 1 – </a:t>
             </a:r>
             <a:r>
-              <a:rPr lang="ru-RU" dirty="0" err="1" smtClean="0"/>
+              <a:rPr lang="ru-RU" dirty="0" smtClean="0">
+                <a:solidFill>
+                  <a:srgbClr val="FF0000"/>
+                </a:solidFill>
+              </a:rPr>
+              <a:t>рандомизация функции </a:t>
+            </a:r>
+            <a:r>
+              <a:rPr lang="ru-RU" dirty="0" err="1" smtClean="0">
+                <a:solidFill>
+                  <a:srgbClr val="FF0000"/>
+                </a:solidFill>
+              </a:rPr>
               <a:t>зашифрования</a:t>
             </a:r>
-            <a:endParaRPr lang="ru-RU" dirty="0" smtClean="0"/>
+            <a:endParaRPr lang="ru-RU" dirty="0" smtClean="0">
+              <a:solidFill>
+                <a:srgbClr val="FF0000"/>
+              </a:solidFill>
+            </a:endParaRPr>
           </a:p>
           <a:p>
             <a:endParaRPr lang="ru-RU" dirty="0"/>
@@ -23527,7 +23713,19 @@
             </a:r>
             <a:r>
               <a:rPr lang="ru-RU" dirty="0" smtClean="0"/>
-              <a:t> всегда длиннее открытых текстов, так как необходимо также передать энтропию, необходимую для восстановления открытого текста</a:t>
+              <a:t> всегда длиннее открытых текстов, так как необходимо также </a:t>
+            </a:r>
+            <a:r>
+              <a:rPr lang="ru-RU" dirty="0" smtClean="0">
+                <a:solidFill>
+                  <a:srgbClr val="FF0000"/>
+                </a:solidFill>
+              </a:rPr>
+              <a:t>передать энтропию</a:t>
+            </a:r>
+            <a:r>
+              <a:rPr lang="ru-RU" dirty="0" smtClean="0"/>
+              <a:t>, необходимую для восстановления открытого текста</a:t>
             </a:r>
             <a:endParaRPr lang="ru-RU" dirty="0"/>
           </a:p>
@@ -27284,7 +27482,12 @@
             <p:ph idx="1"/>
           </p:nvPr>
         </p:nvSpPr>
-        <p:spPr/>
+        <p:spPr>
+          <a:xfrm>
+            <a:off x="838200" y="1825625"/>
+            <a:ext cx="10515600" cy="4777398"/>
+          </a:xfrm>
+        </p:spPr>
         <p:txBody>
           <a:bodyPr>
             <a:normAutofit fontScale="92500"/>
@@ -27345,7 +27548,31 @@
             </a:r>
             <a:r>
               <a:rPr lang="ru-RU" dirty="0" smtClean="0"/>
-              <a:t>Основная идея – сообщения должны быть уникальными для фиксированного ключа.</a:t>
+              <a:t>Основная идея </a:t>
+            </a:r>
+            <a:r>
+              <a:rPr lang="ru-RU" dirty="0" smtClean="0"/>
+              <a:t>–</a:t>
+            </a:r>
+            <a:r>
+              <a:rPr lang="en-US" dirty="0" smtClean="0"/>
+              <a:t> </a:t>
+            </a:r>
+            <a:r>
+              <a:rPr lang="ru-RU" dirty="0" smtClean="0"/>
+              <a:t>новое требование</a:t>
+            </a:r>
+            <a:r>
+              <a:rPr lang="en-US" dirty="0"/>
+              <a:t>:</a:t>
+            </a:r>
+            <a:r>
+              <a:rPr lang="ru-RU" dirty="0" smtClean="0"/>
+              <a:t> </a:t>
+            </a:r>
+            <a:r>
+              <a:rPr lang="ru-RU" dirty="0" smtClean="0"/>
+              <a:t>сообщения должны быть уникальными для фиксированного ключа.</a:t>
             </a:r>
           </a:p>
           <a:p>
@@ -27360,16 +27587,41 @@
             </a:r>
             <a:r>
               <a:rPr lang="ru-RU" dirty="0" smtClean="0"/>
-              <a:t>пользователя </a:t>
+              <a:t>пользователя</a:t>
+            </a:r>
+            <a:r>
+              <a:rPr lang="ru-RU" dirty="0" smtClean="0"/>
+              <a:t>, индекс</a:t>
+            </a:r>
+            <a:r>
+              <a:rPr lang="en-US" dirty="0" smtClean="0"/>
+              <a:t> </a:t>
+            </a:r>
+            <a:r>
+              <a:rPr lang="ru-RU" dirty="0" smtClean="0"/>
+              <a:t>записи в </a:t>
             </a:r>
             <a:r>
               <a:rPr lang="ru-RU" dirty="0" err="1" smtClean="0"/>
-              <a:t>итд</a:t>
+              <a:t>б.д</a:t>
             </a:r>
             <a:r>
               <a:rPr lang="ru-RU" dirty="0" smtClean="0"/>
-              <a:t>)</a:t>
+              <a:t>.</a:t>
             </a:r>
+            <a:r>
+              <a:rPr lang="ru-RU" dirty="0" smtClean="0"/>
+              <a:t> </a:t>
+            </a:r>
+            <a:r>
+              <a:rPr lang="ru-RU" dirty="0" err="1" smtClean="0"/>
+              <a:t>и.т.д</a:t>
+            </a:r>
+            <a:r>
+              <a:rPr lang="ru-RU" smtClean="0"/>
+              <a:t>.)</a:t>
+            </a:r>
+            <a:endParaRPr lang="ru-RU" dirty="0" smtClean="0"/>
           </a:p>
           <a:p>
             <a:pPr lvl="1"/>
@@ -34641,8 +34893,8 @@
           </a:p>
         </p:txBody>
       </p:sp>
-      <mc:AlternateContent xmlns:mc="http://schemas.openxmlformats.org/markup-compatibility/2006" xmlns:a14="http://schemas.microsoft.com/office/drawing/2010/main">
-        <mc:Choice Requires="a14">
+      <mc:AlternateContent xmlns:mc="http://schemas.openxmlformats.org/markup-compatibility/2006">
+        <mc:Choice xmlns:a14="http://schemas.microsoft.com/office/drawing/2010/main" Requires="a14">
           <p:sp>
             <p:nvSpPr>
               <p:cNvPr id="3" name="Объект 2"/>
@@ -34712,6 +34964,9 @@
                         </m:r>
                         <m:r>
                           <a:rPr lang="en-US" b="0" i="1" smtClean="0">
+                            <a:solidFill>
+                              <a:srgbClr val="00B050"/>
+                            </a:solidFill>
                             <a:latin typeface="Cambria Math" panose="02040503050406030204" pitchFamily="18" charset="0"/>
                           </a:rPr>
                           <m:t>𝑛</m:t>
@@ -34765,9 +35020,12 @@
                         </m:r>
                         <m:r>
                           <a:rPr lang="en-US" b="0" i="1" smtClean="0">
-                            <a:latin typeface="Cambria Math" panose="02040503050406030204" pitchFamily="18" charset="0"/>
-                          </a:rPr>
-                          <m:t>𝑚</m:t>
+                            <a:solidFill>
+                              <a:srgbClr val="00B050"/>
+                            </a:solidFill>
+                            <a:latin typeface="Cambria Math" panose="02040503050406030204" pitchFamily="18" charset="0"/>
+                          </a:rPr>
+                          <m:t>𝑛</m:t>
                         </m:r>
                       </m:e>
                     </m:d>
@@ -34789,8 +35047,16 @@
               </a:p>
               <a:p>
                 <a:r>
+                  <a:rPr lang="en-US" dirty="0" smtClean="0">
+                    <a:solidFill>
+                      <a:srgbClr val="00B050"/>
+                    </a:solidFill>
+                  </a:rPr>
+                  <a:t>Nonce</a:t>
+                </a:r>
+                <a:r>
                   <a:rPr lang="en-US" dirty="0" smtClean="0"/>
-                  <a:t>Nonce </a:t>
+                  <a:t> </a:t>
                 </a:r>
                 <a:r>
                   <a:rPr lang="ru-RU" dirty="0" smtClean="0"/>
@@ -34816,13 +35082,53 @@
                 </a:r>
                 <a:r>
                   <a:rPr lang="ru-RU" dirty="0" smtClean="0"/>
-                  <a:t>можно использовать счётчик или случайные величины</a:t>
+                  <a:t>можно использовать </a:t>
+                </a:r>
+                <a:r>
+                  <a:rPr lang="ru-RU" dirty="0" smtClean="0">
+                    <a:solidFill>
+                      <a:srgbClr val="00B050"/>
+                    </a:solidFill>
+                  </a:rPr>
+                  <a:t>счётчик</a:t>
+                </a:r>
+                <a:r>
+                  <a:rPr lang="ru-RU" dirty="0" smtClean="0">
+                    <a:solidFill>
+                      <a:srgbClr val="00B050"/>
+                    </a:solidFill>
+                  </a:rPr>
+                  <a:t>, неубывающую последовательность, </a:t>
+                </a:r>
+                <a:r>
+                  <a:rPr lang="ru-RU" dirty="0" smtClean="0">
+                    <a:solidFill>
+                      <a:srgbClr val="00B050"/>
+                    </a:solidFill>
+                  </a:rPr>
+                  <a:t>случайные </a:t>
+                </a:r>
+                <a:r>
+                  <a:rPr lang="ru-RU" dirty="0" smtClean="0">
+                    <a:solidFill>
+                      <a:srgbClr val="00B050"/>
+                    </a:solidFill>
+                  </a:rPr>
+                  <a:t>величины</a:t>
                 </a:r>
               </a:p>
               <a:p>
                 <a:r>
+                  <a:rPr lang="en-US" dirty="0" smtClean="0">
+                    <a:solidFill>
+                      <a:srgbClr val="00B050"/>
+                    </a:solidFill>
+                  </a:rPr>
+                  <a:t>Nonce</a:t>
+                </a:r>
+                <a:r>
                   <a:rPr lang="en-US" dirty="0" smtClean="0"/>
-                  <a:t>Nonce </a:t>
+                  <a:t> </a:t>
                 </a:r>
                 <a:r>
                   <a:rPr lang="ru-RU" dirty="0" smtClean="0"/>
@@ -34836,8 +35142,16 @@
                   <a:t>Не любое использование </a:t>
                 </a:r>
                 <a:r>
+                  <a:rPr lang="en-US" dirty="0" smtClean="0">
+                    <a:solidFill>
+                      <a:srgbClr val="00B050"/>
+                    </a:solidFill>
+                  </a:rPr>
+                  <a:t>nonce</a:t>
+                </a:r>
+                <a:r>
                   <a:rPr lang="en-US" dirty="0" smtClean="0"/>
-                  <a:t>nonce </a:t>
+                  <a:t> </a:t>
                 </a:r>
                 <a:r>
                   <a:rPr lang="ru-RU" dirty="0" smtClean="0"/>
@@ -34848,7 +35162,7 @@
             </p:txBody>
           </p:sp>
         </mc:Choice>
-        <mc:Fallback xmlns="">
+        <mc:Fallback>
           <p:sp>
             <p:nvSpPr>
               <p:cNvPr id="3" name="Объект 2"/>
@@ -34860,7 +35174,7 @@
               </p:nvPr>
             </p:nvSpPr>
             <p:spPr>
-              <a:blipFill rotWithShape="0">
+              <a:blipFill>
                 <a:blip r:embed="rId2"/>
                 <a:stretch>
                   <a:fillRect l="-928" t="-2101" b="-2381"/>
@@ -35308,8 +35622,8 @@
           </a:p>
         </p:txBody>
       </p:sp>
-      <mc:AlternateContent xmlns:mc="http://schemas.openxmlformats.org/markup-compatibility/2006" xmlns:a14="http://schemas.microsoft.com/office/drawing/2010/main">
-        <mc:Choice Requires="a14">
+      <mc:AlternateContent xmlns:mc="http://schemas.openxmlformats.org/markup-compatibility/2006">
+        <mc:Choice xmlns:a14="http://schemas.microsoft.com/office/drawing/2010/main" Requires="a14">
           <p:sp>
             <p:nvSpPr>
               <p:cNvPr id="3" name="Объект 2"/>
@@ -35896,8 +36210,16 @@
               </a:p>
               <a:p>
                 <a:r>
+                  <a:rPr lang="en-US" b="1" dirty="0" smtClean="0">
+                    <a:solidFill>
+                      <a:srgbClr val="FF0000"/>
+                    </a:solidFill>
+                  </a:rPr>
+                  <a:t>IV</a:t>
+                </a:r>
+                <a:r>
                   <a:rPr lang="en-US" b="1" dirty="0" smtClean="0"/>
-                  <a:t>IV </a:t>
+                  <a:t> </a:t>
                 </a:r>
                 <a:r>
                   <a:rPr lang="ru-RU" b="1" dirty="0" smtClean="0"/>
@@ -35914,7 +36236,7 @@
             </p:txBody>
           </p:sp>
         </mc:Choice>
-        <mc:Fallback xmlns="">
+        <mc:Fallback>
           <p:sp>
             <p:nvSpPr>
               <p:cNvPr id="3" name="Объект 2"/>
@@ -36068,13 +36390,37 @@
             </a:r>
             <a:r>
               <a:rPr lang="ru-RU" dirty="0" smtClean="0"/>
-              <a:t> была больше длины открытых тестов из за добавления вектора инициализации.</a:t>
+              <a:t> была больше длины открытых тестов из за добавления </a:t>
+            </a:r>
+            <a:r>
+              <a:rPr lang="ru-RU" dirty="0" smtClean="0">
+                <a:solidFill>
+                  <a:srgbClr val="FF0000"/>
+                </a:solidFill>
+              </a:rPr>
+              <a:t>вектора инициализации</a:t>
+            </a:r>
+            <a:r>
+              <a:rPr lang="ru-RU" dirty="0" smtClean="0"/>
+              <a:t>.</a:t>
             </a:r>
           </a:p>
           <a:p>
             <a:r>
               <a:rPr lang="ru-RU" dirty="0" smtClean="0"/>
-              <a:t>Длина вектора инициализации не зависит от длины сообщения</a:t>
+              <a:t>Длина </a:t>
+            </a:r>
+            <a:r>
+              <a:rPr lang="ru-RU" dirty="0" smtClean="0">
+                <a:solidFill>
+                  <a:srgbClr val="FF0000"/>
+                </a:solidFill>
+              </a:rPr>
+              <a:t>вектора инициализации </a:t>
+            </a:r>
+            <a:r>
+              <a:rPr lang="ru-RU" dirty="0" smtClean="0"/>
+              <a:t>не зависит от длины сообщения</a:t>
             </a:r>
           </a:p>
           <a:p>
@@ -36100,7 +36446,19 @@
           <a:p>
             <a:r>
               <a:rPr lang="ru-RU" dirty="0" smtClean="0"/>
-              <a:t>Возможно ли уйти от случайных векторов инициализации?</a:t>
+              <a:t>Возможно ли уйти от </a:t>
+            </a:r>
+            <a:r>
+              <a:rPr lang="ru-RU" dirty="0" smtClean="0">
+                <a:solidFill>
+                  <a:srgbClr val="FF0000"/>
+                </a:solidFill>
+              </a:rPr>
+              <a:t>случайных векторов инициализации</a:t>
+            </a:r>
+            <a:r>
+              <a:rPr lang="ru-RU" dirty="0" smtClean="0"/>
+              <a:t>?</a:t>
             </a:r>
           </a:p>
         </p:txBody>
@@ -36232,7 +36590,11 @@
               <a:t>Второй подход – использование </a:t>
             </a:r>
             <a:r>
-              <a:rPr lang="en-US" dirty="0" smtClean="0"/>
+              <a:rPr lang="en-US" dirty="0" smtClean="0">
+                <a:solidFill>
+                  <a:srgbClr val="00B050"/>
+                </a:solidFill>
+              </a:rPr>
               <a:t>nonce</a:t>
             </a:r>
             <a:r>
@@ -36340,8 +36702,8 @@
           </a:p>
         </p:txBody>
       </p:sp>
-      <mc:AlternateContent xmlns:mc="http://schemas.openxmlformats.org/markup-compatibility/2006" xmlns:a14="http://schemas.microsoft.com/office/drawing/2010/main">
-        <mc:Choice Requires="a14">
+      <mc:AlternateContent xmlns:mc="http://schemas.openxmlformats.org/markup-compatibility/2006">
+        <mc:Choice xmlns:a14="http://schemas.microsoft.com/office/drawing/2010/main" Requires="a14">
           <p:sp>
             <p:nvSpPr>
               <p:cNvPr id="3" name="Объект 2"/>
@@ -36463,8 +36825,16 @@
                   <a:t> шифром на основе </a:t>
                 </a:r>
                 <a:r>
+                  <a:rPr lang="en-US" dirty="0" smtClean="0">
+                    <a:solidFill>
+                      <a:srgbClr val="00B050"/>
+                    </a:solidFill>
+                  </a:rPr>
+                  <a:t>nonce</a:t>
+                </a:r>
+                <a:r>
                   <a:rPr lang="en-US" dirty="0" smtClean="0"/>
-                  <a:t>nonce </a:t>
+                  <a:t> </a:t>
                 </a:r>
                 <a:r>
                   <a:rPr lang="ru-RU" dirty="0" smtClean="0"/>
@@ -36650,6 +37020,9 @@
                         </m:r>
                         <m:r>
                           <a:rPr lang="en-US" b="0" i="1" smtClean="0">
+                            <a:solidFill>
+                              <a:srgbClr val="00B050"/>
+                            </a:solidFill>
                             <a:latin typeface="Cambria Math" panose="02040503050406030204" pitchFamily="18" charset="0"/>
                           </a:rPr>
                           <m:t>𝑛</m:t>
@@ -36721,6 +37094,9 @@
                     </m:r>
                     <m:r>
                       <a:rPr lang="en-US" b="0" i="1" smtClean="0">
+                        <a:solidFill>
+                          <a:srgbClr val="00B050"/>
+                        </a:solidFill>
                         <a:latin typeface="Cambria Math" panose="02040503050406030204" pitchFamily="18" charset="0"/>
                       </a:rPr>
                       <m:t>𝑛</m:t>
@@ -36816,6 +37192,9 @@
                             </m:r>
                             <m:r>
                               <a:rPr lang="en-US" b="0" i="1" smtClean="0">
+                                <a:solidFill>
+                                  <a:srgbClr val="00B050"/>
+                                </a:solidFill>
                                 <a:latin typeface="Cambria Math" panose="02040503050406030204" pitchFamily="18" charset="0"/>
                               </a:rPr>
                               <m:t>𝑛</m:t>
@@ -36830,6 +37209,9 @@
                         </m:r>
                         <m:r>
                           <a:rPr lang="en-US" b="0" i="1" smtClean="0">
+                            <a:solidFill>
+                              <a:srgbClr val="00B050"/>
+                            </a:solidFill>
                             <a:latin typeface="Cambria Math" panose="02040503050406030204" pitchFamily="18" charset="0"/>
                           </a:rPr>
                           <m:t>𝑛</m:t>
@@ -36855,7 +37237,7 @@
             </p:txBody>
           </p:sp>
         </mc:Choice>
-        <mc:Fallback xmlns="">
+        <mc:Fallback>
           <p:sp>
             <p:nvSpPr>
               <p:cNvPr id="3" name="Объект 2"/>
@@ -36867,7 +37249,7 @@
               </p:nvPr>
             </p:nvSpPr>
             <p:spPr>
-              <a:blipFill rotWithShape="0">
+              <a:blipFill>
                 <a:blip r:embed="rId2"/>
                 <a:stretch>
                   <a:fillRect l="-1043" t="-2101"/>
@@ -36976,8 +37358,8 @@
           </a:p>
         </p:txBody>
       </p:sp>
-      <mc:AlternateContent xmlns:mc="http://schemas.openxmlformats.org/markup-compatibility/2006" xmlns:a14="http://schemas.microsoft.com/office/drawing/2010/main">
-        <mc:Choice Requires="a14">
+      <mc:AlternateContent xmlns:mc="http://schemas.openxmlformats.org/markup-compatibility/2006">
+        <mc:Choice xmlns:a14="http://schemas.microsoft.com/office/drawing/2010/main" Requires="a14">
           <p:sp>
             <p:nvSpPr>
               <p:cNvPr id="3" name="Объект 2"/>
@@ -37277,7 +37659,11 @@
                   <a:t> Единственное требование – </a:t>
                 </a:r>
                 <a:r>
-                  <a:rPr lang="ru-RU" b="1" dirty="0" smtClean="0"/>
+                  <a:rPr lang="ru-RU" b="1" dirty="0" smtClean="0">
+                    <a:solidFill>
+                      <a:srgbClr val="00B050"/>
+                    </a:solidFill>
+                  </a:rPr>
                   <a:t>уникальность</a:t>
                 </a:r>
                 <a:r>
@@ -37294,7 +37680,7 @@
             </p:txBody>
           </p:sp>
         </mc:Choice>
-        <mc:Fallback xmlns="">
+        <mc:Fallback>
           <p:sp>
             <p:nvSpPr>
               <p:cNvPr id="3" name="Объект 2"/>
@@ -37310,7 +37696,7 @@
                 <a:off x="838200" y="1367692"/>
                 <a:ext cx="10515600" cy="4351338"/>
               </a:xfrm>
-              <a:blipFill rotWithShape="0">
+              <a:blipFill>
                 <a:blip r:embed="rId2"/>
                 <a:stretch>
                   <a:fillRect l="-928" t="-2101"/>
@@ -37431,8 +37817,8 @@
           </a:p>
         </p:txBody>
       </p:sp>
-      <mc:AlternateContent xmlns:mc="http://schemas.openxmlformats.org/markup-compatibility/2006">
-        <mc:Choice xmlns:a14="http://schemas.microsoft.com/office/drawing/2010/main" Requires="a14">
+      <mc:AlternateContent xmlns:mc="http://schemas.openxmlformats.org/markup-compatibility/2006" xmlns:a14="http://schemas.microsoft.com/office/drawing/2010/main">
+        <mc:Choice Requires="a14">
           <p:sp>
             <p:nvSpPr>
               <p:cNvPr id="7" name="Text Box 6"/>
@@ -37485,7 +37871,7 @@
             </p:txBody>
           </p:sp>
         </mc:Choice>
-        <mc:Fallback>
+        <mc:Fallback xmlns="">
           <p:sp>
             <p:nvSpPr>
               <p:cNvPr id="7" name="Text Box 6"/>
@@ -37685,8 +38071,8 @@
             </a:p>
           </p:txBody>
         </p:sp>
-        <mc:AlternateContent xmlns:mc="http://schemas.openxmlformats.org/markup-compatibility/2006" xmlns:a14="http://schemas.microsoft.com/office/drawing/2010/main">
-          <mc:Choice Requires="a14">
+        <mc:AlternateContent xmlns:mc="http://schemas.openxmlformats.org/markup-compatibility/2006">
+          <mc:Choice xmlns:a14="http://schemas.microsoft.com/office/drawing/2010/main" Requires="a14">
             <p:sp>
               <p:nvSpPr>
                 <p:cNvPr id="11" name="Text Box 11"/>
@@ -37938,6 +38324,9 @@
                           <m:sSubPr>
                             <m:ctrlPr>
                               <a:rPr lang="en-US" sz="2000" b="0" i="1" smtClean="0">
+                                <a:solidFill>
+                                  <a:srgbClr val="00B050"/>
+                                </a:solidFill>
                                 <a:latin typeface="Cambria Math" panose="02040503050406030204" pitchFamily="18" charset="0"/>
                                 <a:sym typeface="Symbol" pitchFamily="18" charset="2"/>
                               </a:rPr>
@@ -37946,6 +38335,9 @@
                           <m:e>
                             <m:r>
                               <a:rPr lang="en-US" sz="2000" b="0" i="1" smtClean="0">
+                                <a:solidFill>
+                                  <a:srgbClr val="00B050"/>
+                                </a:solidFill>
                                 <a:latin typeface="Cambria Math" panose="02040503050406030204" pitchFamily="18" charset="0"/>
                                 <a:sym typeface="Symbol" pitchFamily="18" charset="2"/>
                               </a:rPr>
@@ -37955,6 +38347,9 @@
                           <m:sub>
                             <m:r>
                               <a:rPr lang="en-US" sz="2000" b="0" i="1" smtClean="0">
+                                <a:solidFill>
+                                  <a:srgbClr val="00B050"/>
+                                </a:solidFill>
                                 <a:latin typeface="Cambria Math" panose="02040503050406030204" pitchFamily="18" charset="0"/>
                                 <a:sym typeface="Symbol" pitchFamily="18" charset="2"/>
                               </a:rPr>
@@ -37986,7 +38381,7 @@
               </p:txBody>
             </p:sp>
           </mc:Choice>
-          <mc:Fallback xmlns="">
+          <mc:Fallback>
             <p:sp>
               <p:nvSpPr>
                 <p:cNvPr id="11" name="Text Box 11"/>
@@ -38003,7 +38398,7 @@
                 <a:prstGeom prst="rect">
                   <a:avLst/>
                 </a:prstGeom>
-                <a:blipFill rotWithShape="0">
+                <a:blipFill>
                   <a:blip r:embed="rId5"/>
                   <a:stretch>
                     <a:fillRect/>
@@ -38119,8 +38514,8 @@
             </a:p>
           </p:txBody>
         </p:sp>
-        <mc:AlternateContent xmlns:mc="http://schemas.openxmlformats.org/markup-compatibility/2006" xmlns:a14="http://schemas.microsoft.com/office/drawing/2010/main">
-          <mc:Choice Requires="a14">
+        <mc:AlternateContent xmlns:mc="http://schemas.openxmlformats.org/markup-compatibility/2006">
+          <mc:Choice xmlns:a14="http://schemas.microsoft.com/office/drawing/2010/main" Requires="a14">
             <p:sp>
               <p:nvSpPr>
                 <p:cNvPr id="16" name="Text Box 14"/>
@@ -38250,6 +38645,9 @@
                         <m:sSubPr>
                           <m:ctrlPr>
                             <a:rPr lang="en-US" sz="2000" b="0" i="1" smtClean="0">
+                              <a:solidFill>
+                                <a:srgbClr val="00B050"/>
+                              </a:solidFill>
                               <a:latin typeface="Cambria Math" panose="02040503050406030204" pitchFamily="18" charset="0"/>
                             </a:rPr>
                           </m:ctrlPr>
@@ -38257,6 +38655,9 @@
                         <m:e>
                           <m:r>
                             <a:rPr lang="en-US" sz="2000" b="0" i="1" smtClean="0">
+                              <a:solidFill>
+                                <a:srgbClr val="00B050"/>
+                              </a:solidFill>
                               <a:latin typeface="Cambria Math" panose="02040503050406030204" pitchFamily="18" charset="0"/>
                             </a:rPr>
                             <m:t>𝑛</m:t>
@@ -38265,6 +38666,9 @@
                         <m:sub>
                           <m:r>
                             <a:rPr lang="en-US" sz="2000" b="0" i="1" smtClean="0">
+                              <a:solidFill>
+                                <a:srgbClr val="00B050"/>
+                              </a:solidFill>
                               <a:latin typeface="Cambria Math" panose="02040503050406030204" pitchFamily="18" charset="0"/>
                             </a:rPr>
                             <m:t>1</m:t>
@@ -38282,7 +38686,7 @@
               </p:txBody>
             </p:sp>
           </mc:Choice>
-          <mc:Fallback xmlns="">
+          <mc:Fallback>
             <p:sp>
               <p:nvSpPr>
                 <p:cNvPr id="16" name="Text Box 14"/>
@@ -38464,8 +38868,8 @@
             </a:p>
           </p:txBody>
         </p:sp>
-        <mc:AlternateContent xmlns:mc="http://schemas.openxmlformats.org/markup-compatibility/2006" xmlns:a14="http://schemas.microsoft.com/office/drawing/2010/main">
-          <mc:Choice Requires="a14">
+        <mc:AlternateContent xmlns:mc="http://schemas.openxmlformats.org/markup-compatibility/2006">
+          <mc:Choice xmlns:a14="http://schemas.microsoft.com/office/drawing/2010/main" Requires="a14">
             <p:sp>
               <p:nvSpPr>
                 <p:cNvPr id="20" name="Text Box 11"/>
@@ -38695,7 +39099,10 @@
                         <m:sSub>
                           <m:sSubPr>
                             <m:ctrlPr>
-                              <a:rPr lang="en-US" sz="2000" i="1">
+                              <a:rPr lang="en-US" sz="2000" i="1" smtClean="0">
+                                <a:solidFill>
+                                  <a:srgbClr val="00B050"/>
+                                </a:solidFill>
                                 <a:latin typeface="Cambria Math" panose="02040503050406030204" pitchFamily="18" charset="0"/>
                                 <a:sym typeface="Symbol" pitchFamily="18" charset="2"/>
                               </a:rPr>
@@ -38704,6 +39111,9 @@
                           <m:e>
                             <m:r>
                               <a:rPr lang="en-US" sz="2000" i="1">
+                                <a:solidFill>
+                                  <a:srgbClr val="00B050"/>
+                                </a:solidFill>
                                 <a:latin typeface="Cambria Math" panose="02040503050406030204" pitchFamily="18" charset="0"/>
                                 <a:sym typeface="Symbol" pitchFamily="18" charset="2"/>
                               </a:rPr>
@@ -38713,6 +39123,9 @@
                           <m:sub>
                             <m:r>
                               <a:rPr lang="en-US" sz="2000" b="0" i="1" smtClean="0">
+                                <a:solidFill>
+                                  <a:srgbClr val="00B050"/>
+                                </a:solidFill>
                                 <a:latin typeface="Cambria Math" panose="02040503050406030204" pitchFamily="18" charset="0"/>
                                 <a:sym typeface="Symbol" pitchFamily="18" charset="2"/>
                               </a:rPr>
@@ -38762,6 +39175,9 @@
                           <m:sSubPr>
                             <m:ctrlPr>
                               <a:rPr lang="en-US" sz="2000" b="0" i="1" smtClean="0">
+                                <a:solidFill>
+                                  <a:srgbClr val="00B050"/>
+                                </a:solidFill>
                                 <a:latin typeface="Cambria Math" panose="02040503050406030204" pitchFamily="18" charset="0"/>
                                 <a:sym typeface="Symbol" pitchFamily="18" charset="2"/>
                               </a:rPr>
@@ -38770,6 +39186,9 @@
                           <m:e>
                             <m:r>
                               <a:rPr lang="en-US" sz="2000" b="0" i="1" smtClean="0">
+                                <a:solidFill>
+                                  <a:srgbClr val="00B050"/>
+                                </a:solidFill>
                                 <a:latin typeface="Cambria Math" panose="02040503050406030204" pitchFamily="18" charset="0"/>
                                 <a:sym typeface="Symbol" pitchFamily="18" charset="2"/>
                               </a:rPr>
@@ -38779,6 +39198,9 @@
                           <m:sub>
                             <m:r>
                               <a:rPr lang="en-US" sz="2000" b="0" i="1" smtClean="0">
+                                <a:solidFill>
+                                  <a:srgbClr val="00B050"/>
+                                </a:solidFill>
                                 <a:latin typeface="Cambria Math" panose="02040503050406030204" pitchFamily="18" charset="0"/>
                                 <a:sym typeface="Symbol" pitchFamily="18" charset="2"/>
                               </a:rPr>
@@ -38788,6 +39210,9 @@
                         </m:sSub>
                         <m:r>
                           <a:rPr lang="en-US" sz="2000" b="0" i="1" smtClean="0">
+                            <a:solidFill>
+                              <a:srgbClr val="00B050"/>
+                            </a:solidFill>
                             <a:latin typeface="Cambria Math" panose="02040503050406030204" pitchFamily="18" charset="0"/>
                             <a:sym typeface="Symbol" pitchFamily="18" charset="2"/>
                           </a:rPr>
@@ -38797,6 +39222,9 @@
                           <m:sSubPr>
                             <m:ctrlPr>
                               <a:rPr lang="en-US" sz="2000" b="0" i="1" smtClean="0">
+                                <a:solidFill>
+                                  <a:srgbClr val="00B050"/>
+                                </a:solidFill>
                                 <a:latin typeface="Cambria Math" panose="02040503050406030204" pitchFamily="18" charset="0"/>
                                 <a:sym typeface="Symbol" pitchFamily="18" charset="2"/>
                               </a:rPr>
@@ -38805,6 +39233,9 @@
                           <m:e>
                             <m:r>
                               <a:rPr lang="en-US" sz="2000" b="0" i="1" smtClean="0">
+                                <a:solidFill>
+                                  <a:srgbClr val="00B050"/>
+                                </a:solidFill>
                                 <a:latin typeface="Cambria Math" panose="02040503050406030204" pitchFamily="18" charset="0"/>
                                 <a:sym typeface="Symbol" pitchFamily="18" charset="2"/>
                               </a:rPr>
@@ -38814,6 +39245,9 @@
                           <m:sub>
                             <m:r>
                               <a:rPr lang="en-US" sz="2000" b="0" i="1" smtClean="0">
+                                <a:solidFill>
+                                  <a:srgbClr val="00B050"/>
+                                </a:solidFill>
                                 <a:latin typeface="Cambria Math" panose="02040503050406030204" pitchFamily="18" charset="0"/>
                                 <a:sym typeface="Symbol" pitchFamily="18" charset="2"/>
                               </a:rPr>
@@ -38821,6 +39255,9 @@
                             </m:r>
                             <m:r>
                               <a:rPr lang="en-US" sz="2000" b="0" i="1" smtClean="0">
+                                <a:solidFill>
+                                  <a:srgbClr val="00B050"/>
+                                </a:solidFill>
                                 <a:latin typeface="Cambria Math" panose="02040503050406030204" pitchFamily="18" charset="0"/>
                                 <a:sym typeface="Symbol" pitchFamily="18" charset="2"/>
                               </a:rPr>
@@ -38850,7 +39287,7 @@
               </p:txBody>
             </p:sp>
           </mc:Choice>
-          <mc:Fallback xmlns="">
+          <mc:Fallback>
             <p:sp>
               <p:nvSpPr>
                 <p:cNvPr id="20" name="Text Box 11"/>
@@ -38867,7 +39304,7 @@
                 <a:prstGeom prst="rect">
                   <a:avLst/>
                 </a:prstGeom>
-                <a:blipFill rotWithShape="0">
+                <a:blipFill>
                   <a:blip r:embed="rId8"/>
                   <a:stretch>
                     <a:fillRect/>
@@ -38948,8 +39385,8 @@
             </a:p>
           </p:txBody>
         </p:sp>
-        <mc:AlternateContent xmlns:mc="http://schemas.openxmlformats.org/markup-compatibility/2006" xmlns:a14="http://schemas.microsoft.com/office/drawing/2010/main">
-          <mc:Choice Requires="a14">
+        <mc:AlternateContent xmlns:mc="http://schemas.openxmlformats.org/markup-compatibility/2006">
+          <mc:Choice xmlns:a14="http://schemas.microsoft.com/office/drawing/2010/main" Requires="a14">
             <p:sp>
               <p:nvSpPr>
                 <p:cNvPr id="23" name="Text Box 14"/>
@@ -39082,7 +39519,10 @@
                       <m:sSub>
                         <m:sSubPr>
                           <m:ctrlPr>
-                            <a:rPr lang="en-US" sz="2000" i="1">
+                            <a:rPr lang="en-US" sz="2000" i="1" smtClean="0">
+                              <a:solidFill>
+                                <a:srgbClr val="00B050"/>
+                              </a:solidFill>
                               <a:latin typeface="Cambria Math" panose="02040503050406030204" pitchFamily="18" charset="0"/>
                             </a:rPr>
                           </m:ctrlPr>
@@ -39090,6 +39530,9 @@
                         <m:e>
                           <m:r>
                             <a:rPr lang="en-US" sz="2000" i="1">
+                              <a:solidFill>
+                                <a:srgbClr val="00B050"/>
+                              </a:solidFill>
                               <a:latin typeface="Cambria Math" panose="02040503050406030204" pitchFamily="18" charset="0"/>
                             </a:rPr>
                             <m:t>𝑛</m:t>
@@ -39098,6 +39541,9 @@
                         <m:sub>
                           <m:r>
                             <a:rPr lang="en-US" sz="2000" b="0" i="1" smtClean="0">
+                              <a:solidFill>
+                                <a:srgbClr val="00B050"/>
+                              </a:solidFill>
                               <a:latin typeface="Cambria Math" panose="02040503050406030204" pitchFamily="18" charset="0"/>
                             </a:rPr>
                             <m:t>𝑖</m:t>
@@ -39115,7 +39561,7 @@
               </p:txBody>
             </p:sp>
           </mc:Choice>
-          <mc:Fallback xmlns="">
+          <mc:Fallback>
             <p:sp>
               <p:nvSpPr>
                 <p:cNvPr id="23" name="Text Box 14"/>

</xml_diff>

<commit_message>
even more lec 8 fixes
</commit_message>
<xml_diff>
--- a/Lectures/Lecture8.pptx
+++ b/Lectures/Lecture8.pptx
@@ -313,7 +313,7 @@
           <a:p>
             <a:fld id="{CBA08D16-15DC-4E25-BDC3-F25146157B16}" type="datetimeFigureOut">
               <a:rPr lang="ru-RU" smtClean="0"/>
-              <a:t>08.11.2023</a:t>
+              <a:t>09.11.2023</a:t>
             </a:fld>
             <a:endParaRPr lang="ru-RU"/>
           </a:p>
@@ -983,7 +983,7 @@
           <a:p>
             <a:fld id="{FCEC8293-DB51-454A-BE81-EC8FCB31EBA2}" type="datetime1">
               <a:rPr lang="ru-RU" smtClean="0"/>
-              <a:t>08.11.2023</a:t>
+              <a:t>09.11.2023</a:t>
             </a:fld>
             <a:endParaRPr lang="ru-RU"/>
           </a:p>
@@ -1157,7 +1157,7 @@
           <a:p>
             <a:fld id="{241C87B1-1C35-4DBD-BC18-2BC72E776603}" type="datetime1">
               <a:rPr lang="ru-RU" smtClean="0"/>
-              <a:t>08.11.2023</a:t>
+              <a:t>09.11.2023</a:t>
             </a:fld>
             <a:endParaRPr lang="ru-RU"/>
           </a:p>
@@ -1341,7 +1341,7 @@
           <a:p>
             <a:fld id="{3134C275-26C0-42CD-9111-9ADE65922AF9}" type="datetime1">
               <a:rPr lang="ru-RU" smtClean="0"/>
-              <a:t>08.11.2023</a:t>
+              <a:t>09.11.2023</a:t>
             </a:fld>
             <a:endParaRPr lang="ru-RU"/>
           </a:p>
@@ -1552,7 +1552,7 @@
           <a:p>
             <a:fld id="{C1A9A50B-C350-45F5-8AAB-ADB9E670AF2E}" type="datetime1">
               <a:rPr lang="ru-RU" smtClean="0"/>
-              <a:t>08.11.2023</a:t>
+              <a:t>09.11.2023</a:t>
             </a:fld>
             <a:endParaRPr lang="ru-RU"/>
           </a:p>
@@ -1802,7 +1802,7 @@
           <a:p>
             <a:fld id="{089688C9-348F-42F9-B6C0-5990DDE0C5B2}" type="datetime1">
               <a:rPr lang="ru-RU" smtClean="0"/>
-              <a:t>08.11.2023</a:t>
+              <a:t>09.11.2023</a:t>
             </a:fld>
             <a:endParaRPr lang="ru-RU"/>
           </a:p>
@@ -2038,7 +2038,7 @@
           <a:p>
             <a:fld id="{684AFD8F-6DD9-4AD3-A505-FDC3F5C5F3F6}" type="datetime1">
               <a:rPr lang="ru-RU" smtClean="0"/>
-              <a:t>08.11.2023</a:t>
+              <a:t>09.11.2023</a:t>
             </a:fld>
             <a:endParaRPr lang="ru-RU"/>
           </a:p>
@@ -2409,7 +2409,7 @@
           <a:p>
             <a:fld id="{63551EFE-4D02-45EB-A747-8B6F047B5AA0}" type="datetime1">
               <a:rPr lang="ru-RU" smtClean="0"/>
-              <a:t>08.11.2023</a:t>
+              <a:t>09.11.2023</a:t>
             </a:fld>
             <a:endParaRPr lang="ru-RU"/>
           </a:p>
@@ -2531,7 +2531,7 @@
           <a:p>
             <a:fld id="{813A9F34-E5CD-4B8F-AA9E-889C84372B20}" type="datetime1">
               <a:rPr lang="ru-RU" smtClean="0"/>
-              <a:t>08.11.2023</a:t>
+              <a:t>09.11.2023</a:t>
             </a:fld>
             <a:endParaRPr lang="ru-RU"/>
           </a:p>
@@ -2630,7 +2630,7 @@
           <a:p>
             <a:fld id="{51224D22-9B29-44A6-8E82-95FC492DEDC1}" type="datetime1">
               <a:rPr lang="ru-RU" smtClean="0"/>
-              <a:t>08.11.2023</a:t>
+              <a:t>09.11.2023</a:t>
             </a:fld>
             <a:endParaRPr lang="ru-RU"/>
           </a:p>
@@ -2911,7 +2911,7 @@
           <a:p>
             <a:fld id="{91D1034F-4441-48A1-BDC0-25EA1022324A}" type="datetime1">
               <a:rPr lang="ru-RU" smtClean="0"/>
-              <a:t>08.11.2023</a:t>
+              <a:t>09.11.2023</a:t>
             </a:fld>
             <a:endParaRPr lang="ru-RU"/>
           </a:p>
@@ -3168,7 +3168,7 @@
           <a:p>
             <a:fld id="{B0FFDE79-B627-473B-AE17-4C65BD2495F7}" type="datetime1">
               <a:rPr lang="ru-RU" smtClean="0"/>
-              <a:t>08.11.2023</a:t>
+              <a:t>09.11.2023</a:t>
             </a:fld>
             <a:endParaRPr lang="ru-RU"/>
           </a:p>
@@ -3385,7 +3385,7 @@
           <a:p>
             <a:fld id="{11CA537A-1B8C-47BA-9BA6-7CE3FAFDA8BE}" type="datetime1">
               <a:rPr lang="ru-RU" smtClean="0"/>
-              <a:t>08.11.2023</a:t>
+              <a:t>09.11.2023</a:t>
             </a:fld>
             <a:endParaRPr lang="ru-RU"/>
           </a:p>
@@ -3892,11 +3892,7 @@
           <a:p>
             <a:r>
               <a:rPr lang="ru-RU" dirty="0" smtClean="0"/>
-              <a:t>МИФИ </a:t>
-            </a:r>
-            <a:r>
-              <a:rPr lang="ru-RU" dirty="0" smtClean="0"/>
-              <a:t>202</a:t>
+              <a:t>МИФИ 202</a:t>
             </a:r>
             <a:r>
               <a:rPr lang="en-US" dirty="0"/>
@@ -3966,8 +3962,8 @@
           </a:p>
         </p:txBody>
       </p:sp>
-      <mc:AlternateContent xmlns:mc="http://schemas.openxmlformats.org/markup-compatibility/2006">
-        <mc:Choice xmlns:a14="http://schemas.microsoft.com/office/drawing/2010/main" Requires="a14">
+      <mc:AlternateContent xmlns:mc="http://schemas.openxmlformats.org/markup-compatibility/2006" xmlns:a14="http://schemas.microsoft.com/office/drawing/2010/main">
+        <mc:Choice Requires="a14">
           <p:sp>
             <p:nvSpPr>
               <p:cNvPr id="3" name="Объект 2"/>
@@ -5236,7 +5232,7 @@
             </p:txBody>
           </p:sp>
         </mc:Choice>
-        <mc:Fallback>
+        <mc:Fallback xmlns="">
           <p:sp>
             <p:nvSpPr>
               <p:cNvPr id="3" name="Объект 2"/>
@@ -6092,8 +6088,8 @@
             </a:p>
           </p:txBody>
         </p:sp>
-        <mc:AlternateContent xmlns:mc="http://schemas.openxmlformats.org/markup-compatibility/2006">
-          <mc:Choice xmlns:a14="http://schemas.microsoft.com/office/drawing/2010/main" Requires="a14">
+        <mc:AlternateContent xmlns:mc="http://schemas.openxmlformats.org/markup-compatibility/2006" xmlns:a14="http://schemas.microsoft.com/office/drawing/2010/main">
+          <mc:Choice Requires="a14">
             <p:sp>
               <p:nvSpPr>
                 <p:cNvPr id="15" name="Text Box 14"/>
@@ -6278,7 +6274,7 @@
               </p:txBody>
             </p:sp>
           </mc:Choice>
-          <mc:Fallback>
+          <mc:Fallback xmlns="">
             <p:sp>
               <p:nvSpPr>
                 <p:cNvPr id="15" name="Text Box 14"/>
@@ -6493,8 +6489,8 @@
           </p:sp>
         </mc:Fallback>
       </mc:AlternateContent>
-      <mc:AlternateContent xmlns:mc="http://schemas.openxmlformats.org/markup-compatibility/2006">
-        <mc:Choice xmlns:a14="http://schemas.microsoft.com/office/drawing/2010/main" Requires="a14">
+      <mc:AlternateContent xmlns:mc="http://schemas.openxmlformats.org/markup-compatibility/2006" xmlns:a14="http://schemas.microsoft.com/office/drawing/2010/main">
+        <mc:Choice Requires="a14">
           <p:sp>
             <p:nvSpPr>
               <p:cNvPr id="24" name="Text Box 13"/>
@@ -6767,7 +6763,7 @@
             </p:txBody>
           </p:sp>
         </mc:Choice>
-        <mc:Fallback>
+        <mc:Fallback xmlns="">
           <p:sp>
             <p:nvSpPr>
               <p:cNvPr id="24" name="Text Box 13"/>
@@ -7789,8 +7785,8 @@
           </a:p>
         </p:txBody>
       </p:sp>
-      <mc:AlternateContent xmlns:mc="http://schemas.openxmlformats.org/markup-compatibility/2006">
-        <mc:Choice xmlns:a14="http://schemas.microsoft.com/office/drawing/2010/main" Requires="a14">
+      <mc:AlternateContent xmlns:mc="http://schemas.openxmlformats.org/markup-compatibility/2006" xmlns:a14="http://schemas.microsoft.com/office/drawing/2010/main">
+        <mc:Choice Requires="a14">
           <p:sp>
             <p:nvSpPr>
               <p:cNvPr id="3" name="Объект 2"/>
@@ -8800,7 +8796,7 @@
             </p:txBody>
           </p:sp>
         </mc:Choice>
-        <mc:Fallback>
+        <mc:Fallback xmlns="">
           <p:sp>
             <p:nvSpPr>
               <p:cNvPr id="3" name="Объект 2"/>
@@ -9748,8 +9744,8 @@
           </a:p>
         </p:txBody>
       </p:sp>
-      <mc:AlternateContent xmlns:mc="http://schemas.openxmlformats.org/markup-compatibility/2006">
-        <mc:Choice xmlns:a14="http://schemas.microsoft.com/office/drawing/2010/main" Requires="a14">
+      <mc:AlternateContent xmlns:mc="http://schemas.openxmlformats.org/markup-compatibility/2006" xmlns:a14="http://schemas.microsoft.com/office/drawing/2010/main">
+        <mc:Choice Requires="a14">
           <p:sp>
             <p:nvSpPr>
               <p:cNvPr id="3" name="Объект 2"/>
@@ -10430,7 +10426,7 @@
             </p:txBody>
           </p:sp>
         </mc:Choice>
-        <mc:Fallback>
+        <mc:Fallback xmlns="">
           <p:sp>
             <p:nvSpPr>
               <p:cNvPr id="3" name="Объект 2"/>
@@ -11378,8 +11374,8 @@
             </a:p>
           </p:txBody>
         </p:sp>
-        <mc:AlternateContent xmlns:mc="http://schemas.openxmlformats.org/markup-compatibility/2006">
-          <mc:Choice xmlns:a14="http://schemas.microsoft.com/office/drawing/2010/main" Requires="a14">
+        <mc:AlternateContent xmlns:mc="http://schemas.openxmlformats.org/markup-compatibility/2006" xmlns:a14="http://schemas.microsoft.com/office/drawing/2010/main">
+          <mc:Choice Requires="a14">
             <p:sp>
               <p:nvSpPr>
                 <p:cNvPr id="15" name="Text Box 14"/>
@@ -11506,7 +11502,7 @@
               </p:txBody>
             </p:sp>
           </mc:Choice>
-          <mc:Fallback>
+          <mc:Fallback xmlns="">
             <p:sp>
               <p:nvSpPr>
                 <p:cNvPr id="15" name="Text Box 14"/>
@@ -11721,8 +11717,8 @@
           </p:sp>
         </mc:Fallback>
       </mc:AlternateContent>
-      <mc:AlternateContent xmlns:mc="http://schemas.openxmlformats.org/markup-compatibility/2006">
-        <mc:Choice xmlns:a14="http://schemas.microsoft.com/office/drawing/2010/main" Requires="a14">
+      <mc:AlternateContent xmlns:mc="http://schemas.openxmlformats.org/markup-compatibility/2006" xmlns:a14="http://schemas.microsoft.com/office/drawing/2010/main">
+        <mc:Choice Requires="a14">
           <p:sp>
             <p:nvSpPr>
               <p:cNvPr id="24" name="Text Box 13"/>
@@ -12208,7 +12204,7 @@
             </p:txBody>
           </p:sp>
         </mc:Choice>
-        <mc:Fallback>
+        <mc:Fallback xmlns="">
           <p:sp>
             <p:nvSpPr>
               <p:cNvPr id="24" name="Text Box 13"/>
@@ -12527,11 +12523,7 @@
             </a:r>
             <a:r>
               <a:rPr lang="ru-RU" dirty="0" err="1" smtClean="0"/>
-              <a:t>р</a:t>
-            </a:r>
-            <a:r>
-              <a:rPr lang="ru-RU" dirty="0" err="1" smtClean="0"/>
-              <a:t>андомизированного</a:t>
+              <a:t>рандомизированного</a:t>
             </a:r>
             <a:r>
               <a:rPr lang="ru-RU" dirty="0" smtClean="0"/>
@@ -13062,8 +13054,8 @@
           </a:p>
         </p:txBody>
       </p:sp>
-      <mc:AlternateContent xmlns:mc="http://schemas.openxmlformats.org/markup-compatibility/2006">
-        <mc:Choice xmlns:a14="http://schemas.microsoft.com/office/drawing/2010/main" Requires="a14">
+      <mc:AlternateContent xmlns:mc="http://schemas.openxmlformats.org/markup-compatibility/2006" xmlns:a14="http://schemas.microsoft.com/office/drawing/2010/main">
+        <mc:Choice Requires="a14">
           <p:sp>
             <p:nvSpPr>
               <p:cNvPr id="3" name="Объект 2"/>
@@ -13563,7 +13555,7 @@
             </p:txBody>
           </p:sp>
         </mc:Choice>
-        <mc:Fallback>
+        <mc:Fallback xmlns="">
           <p:sp>
             <p:nvSpPr>
               <p:cNvPr id="3" name="Объект 2"/>
@@ -14333,8 +14325,8 @@
           </a:p>
         </p:txBody>
       </p:sp>
-      <mc:AlternateContent xmlns:mc="http://schemas.openxmlformats.org/markup-compatibility/2006">
-        <mc:Choice xmlns:a14="http://schemas.microsoft.com/office/drawing/2010/main" Requires="a14">
+      <mc:AlternateContent xmlns:mc="http://schemas.openxmlformats.org/markup-compatibility/2006" xmlns:a14="http://schemas.microsoft.com/office/drawing/2010/main">
+        <mc:Choice Requires="a14">
           <p:sp>
             <p:nvSpPr>
               <p:cNvPr id="3" name="Объект 2"/>
@@ -14925,7 +14917,7 @@
             </p:txBody>
           </p:sp>
         </mc:Choice>
-        <mc:Fallback>
+        <mc:Fallback xmlns="">
           <p:sp>
             <p:nvSpPr>
               <p:cNvPr id="3" name="Объект 2"/>
@@ -19838,8 +19830,8 @@
           </p:sp>
         </mc:Fallback>
       </mc:AlternateContent>
-      <mc:AlternateContent xmlns:mc="http://schemas.openxmlformats.org/markup-compatibility/2006">
-        <mc:Choice xmlns:a14="http://schemas.microsoft.com/office/drawing/2010/main" Requires="a14">
+      <mc:AlternateContent xmlns:mc="http://schemas.openxmlformats.org/markup-compatibility/2006" xmlns:a14="http://schemas.microsoft.com/office/drawing/2010/main">
+        <mc:Choice Requires="a14">
           <p:sp>
             <p:nvSpPr>
               <p:cNvPr id="24" name="Text Box 13"/>
@@ -20191,7 +20183,7 @@
             </p:txBody>
           </p:sp>
         </mc:Choice>
-        <mc:Fallback>
+        <mc:Fallback xmlns="">
           <p:sp>
             <p:nvSpPr>
               <p:cNvPr id="24" name="Text Box 13"/>
@@ -21130,8 +21122,8 @@
           </a:p>
         </p:txBody>
       </p:sp>
-      <mc:AlternateContent xmlns:mc="http://schemas.openxmlformats.org/markup-compatibility/2006">
-        <mc:Choice xmlns:a14="http://schemas.microsoft.com/office/drawing/2010/main" Requires="a14">
+      <mc:AlternateContent xmlns:mc="http://schemas.openxmlformats.org/markup-compatibility/2006" xmlns:a14="http://schemas.microsoft.com/office/drawing/2010/main">
+        <mc:Choice Requires="a14">
           <p:sp>
             <p:nvSpPr>
               <p:cNvPr id="3" name="Объект 2"/>
@@ -21614,7 +21606,7 @@
             </p:txBody>
           </p:sp>
         </mc:Choice>
-        <mc:Fallback>
+        <mc:Fallback xmlns="">
           <p:sp>
             <p:nvSpPr>
               <p:cNvPr id="3" name="Объект 2"/>
@@ -21731,8 +21723,8 @@
           </a:p>
         </p:txBody>
       </p:sp>
-      <mc:AlternateContent xmlns:mc="http://schemas.openxmlformats.org/markup-compatibility/2006">
-        <mc:Choice xmlns:a14="http://schemas.microsoft.com/office/drawing/2010/main" Requires="a14">
+      <mc:AlternateContent xmlns:mc="http://schemas.openxmlformats.org/markup-compatibility/2006" xmlns:a14="http://schemas.microsoft.com/office/drawing/2010/main">
+        <mc:Choice Requires="a14">
           <p:sp>
             <p:nvSpPr>
               <p:cNvPr id="3" name="Объект 2"/>
@@ -22192,7 +22184,7 @@
             </p:txBody>
           </p:sp>
         </mc:Choice>
-        <mc:Fallback>
+        <mc:Fallback xmlns="">
           <p:sp>
             <p:nvSpPr>
               <p:cNvPr id="3" name="Объект 2"/>
@@ -27548,11 +27540,7 @@
             </a:r>
             <a:r>
               <a:rPr lang="ru-RU" dirty="0" smtClean="0"/>
-              <a:t>Основная идея </a:t>
-            </a:r>
-            <a:r>
-              <a:rPr lang="ru-RU" dirty="0" smtClean="0"/>
-              <a:t>–</a:t>
+              <a:t>Основная идея –</a:t>
             </a:r>
             <a:r>
               <a:rPr lang="en-US" dirty="0" smtClean="0"/>
@@ -27568,11 +27556,7 @@
             </a:r>
             <a:r>
               <a:rPr lang="ru-RU" dirty="0" smtClean="0"/>
-              <a:t> </a:t>
-            </a:r>
-            <a:r>
-              <a:rPr lang="ru-RU" dirty="0" smtClean="0"/>
-              <a:t>сообщения должны быть уникальными для фиксированного ключа.</a:t>
+              <a:t> сообщения должны быть уникальными для фиксированного ключа.</a:t>
             </a:r>
           </a:p>
           <a:p>
@@ -27587,11 +27571,7 @@
             </a:r>
             <a:r>
               <a:rPr lang="ru-RU" dirty="0" smtClean="0"/>
-              <a:t>пользователя</a:t>
-            </a:r>
-            <a:r>
-              <a:rPr lang="ru-RU" dirty="0" smtClean="0"/>
-              <a:t>, индекс</a:t>
+              <a:t>пользователя, индекс</a:t>
             </a:r>
             <a:r>
               <a:rPr lang="en-US" dirty="0" smtClean="0"/>
@@ -27607,11 +27587,7 @@
             </a:r>
             <a:r>
               <a:rPr lang="ru-RU" dirty="0" smtClean="0"/>
-              <a:t>.</a:t>
-            </a:r>
-            <a:r>
-              <a:rPr lang="ru-RU" dirty="0" smtClean="0"/>
-              <a:t> </a:t>
+              <a:t>. </a:t>
             </a:r>
             <a:r>
               <a:rPr lang="ru-RU" dirty="0" err="1" smtClean="0"/>
@@ -35090,7 +35066,15 @@
                       <a:srgbClr val="00B050"/>
                     </a:solidFill>
                   </a:rPr>
-                  <a:t>счётчик</a:t>
+                  <a:t>счётчик, </a:t>
+                </a:r>
+                <a:r>
+                  <a:rPr lang="ru-RU" smtClean="0">
+                    <a:solidFill>
+                      <a:srgbClr val="00B050"/>
+                    </a:solidFill>
+                  </a:rPr>
+                  <a:t>строго возрастающую </a:t>
                 </a:r>
                 <a:r>
                   <a:rPr lang="ru-RU" dirty="0" smtClean="0">
@@ -35098,23 +35082,7 @@
                       <a:srgbClr val="00B050"/>
                     </a:solidFill>
                   </a:rPr>
-                  <a:t>, неубывающую последовательность, </a:t>
-                </a:r>
-                <a:r>
-                  <a:rPr lang="ru-RU" dirty="0" smtClean="0">
-                    <a:solidFill>
-                      <a:srgbClr val="00B050"/>
-                    </a:solidFill>
-                  </a:rPr>
-                  <a:t>случайные </a:t>
-                </a:r>
-                <a:r>
-                  <a:rPr lang="ru-RU" dirty="0" smtClean="0">
-                    <a:solidFill>
-                      <a:srgbClr val="00B050"/>
-                    </a:solidFill>
-                  </a:rPr>
-                  <a:t>величины</a:t>
+                  <a:t>последовательность, случайные величины</a:t>
                 </a:r>
               </a:p>
               <a:p>
@@ -35622,8 +35590,8 @@
           </a:p>
         </p:txBody>
       </p:sp>
-      <mc:AlternateContent xmlns:mc="http://schemas.openxmlformats.org/markup-compatibility/2006">
-        <mc:Choice xmlns:a14="http://schemas.microsoft.com/office/drawing/2010/main" Requires="a14">
+      <mc:AlternateContent xmlns:mc="http://schemas.openxmlformats.org/markup-compatibility/2006" xmlns:a14="http://schemas.microsoft.com/office/drawing/2010/main">
+        <mc:Choice Requires="a14">
           <p:sp>
             <p:nvSpPr>
               <p:cNvPr id="3" name="Объект 2"/>
@@ -36236,7 +36204,7 @@
             </p:txBody>
           </p:sp>
         </mc:Choice>
-        <mc:Fallback>
+        <mc:Fallback xmlns="">
           <p:sp>
             <p:nvSpPr>
               <p:cNvPr id="3" name="Объект 2"/>
@@ -36702,8 +36670,8 @@
           </a:p>
         </p:txBody>
       </p:sp>
-      <mc:AlternateContent xmlns:mc="http://schemas.openxmlformats.org/markup-compatibility/2006">
-        <mc:Choice xmlns:a14="http://schemas.microsoft.com/office/drawing/2010/main" Requires="a14">
+      <mc:AlternateContent xmlns:mc="http://schemas.openxmlformats.org/markup-compatibility/2006" xmlns:a14="http://schemas.microsoft.com/office/drawing/2010/main">
+        <mc:Choice Requires="a14">
           <p:sp>
             <p:nvSpPr>
               <p:cNvPr id="3" name="Объект 2"/>
@@ -37237,7 +37205,7 @@
             </p:txBody>
           </p:sp>
         </mc:Choice>
-        <mc:Fallback>
+        <mc:Fallback xmlns="">
           <p:sp>
             <p:nvSpPr>
               <p:cNvPr id="3" name="Объект 2"/>
@@ -37358,8 +37326,8 @@
           </a:p>
         </p:txBody>
       </p:sp>
-      <mc:AlternateContent xmlns:mc="http://schemas.openxmlformats.org/markup-compatibility/2006">
-        <mc:Choice xmlns:a14="http://schemas.microsoft.com/office/drawing/2010/main" Requires="a14">
+      <mc:AlternateContent xmlns:mc="http://schemas.openxmlformats.org/markup-compatibility/2006" xmlns:a14="http://schemas.microsoft.com/office/drawing/2010/main">
+        <mc:Choice Requires="a14">
           <p:sp>
             <p:nvSpPr>
               <p:cNvPr id="3" name="Объект 2"/>
@@ -37680,7 +37648,7 @@
             </p:txBody>
           </p:sp>
         </mc:Choice>
-        <mc:Fallback>
+        <mc:Fallback xmlns="">
           <p:sp>
             <p:nvSpPr>
               <p:cNvPr id="3" name="Объект 2"/>
@@ -38071,8 +38039,8 @@
             </a:p>
           </p:txBody>
         </p:sp>
-        <mc:AlternateContent xmlns:mc="http://schemas.openxmlformats.org/markup-compatibility/2006">
-          <mc:Choice xmlns:a14="http://schemas.microsoft.com/office/drawing/2010/main" Requires="a14">
+        <mc:AlternateContent xmlns:mc="http://schemas.openxmlformats.org/markup-compatibility/2006" xmlns:a14="http://schemas.microsoft.com/office/drawing/2010/main">
+          <mc:Choice Requires="a14">
             <p:sp>
               <p:nvSpPr>
                 <p:cNvPr id="11" name="Text Box 11"/>
@@ -38381,7 +38349,7 @@
               </p:txBody>
             </p:sp>
           </mc:Choice>
-          <mc:Fallback>
+          <mc:Fallback xmlns="">
             <p:sp>
               <p:nvSpPr>
                 <p:cNvPr id="11" name="Text Box 11"/>
@@ -38514,8 +38482,8 @@
             </a:p>
           </p:txBody>
         </p:sp>
-        <mc:AlternateContent xmlns:mc="http://schemas.openxmlformats.org/markup-compatibility/2006">
-          <mc:Choice xmlns:a14="http://schemas.microsoft.com/office/drawing/2010/main" Requires="a14">
+        <mc:AlternateContent xmlns:mc="http://schemas.openxmlformats.org/markup-compatibility/2006" xmlns:a14="http://schemas.microsoft.com/office/drawing/2010/main">
+          <mc:Choice Requires="a14">
             <p:sp>
               <p:nvSpPr>
                 <p:cNvPr id="16" name="Text Box 14"/>
@@ -38686,7 +38654,7 @@
               </p:txBody>
             </p:sp>
           </mc:Choice>
-          <mc:Fallback>
+          <mc:Fallback xmlns="">
             <p:sp>
               <p:nvSpPr>
                 <p:cNvPr id="16" name="Text Box 14"/>
@@ -38868,8 +38836,8 @@
             </a:p>
           </p:txBody>
         </p:sp>
-        <mc:AlternateContent xmlns:mc="http://schemas.openxmlformats.org/markup-compatibility/2006">
-          <mc:Choice xmlns:a14="http://schemas.microsoft.com/office/drawing/2010/main" Requires="a14">
+        <mc:AlternateContent xmlns:mc="http://schemas.openxmlformats.org/markup-compatibility/2006" xmlns:a14="http://schemas.microsoft.com/office/drawing/2010/main">
+          <mc:Choice Requires="a14">
             <p:sp>
               <p:nvSpPr>
                 <p:cNvPr id="20" name="Text Box 11"/>
@@ -39287,7 +39255,7 @@
               </p:txBody>
             </p:sp>
           </mc:Choice>
-          <mc:Fallback>
+          <mc:Fallback xmlns="">
             <p:sp>
               <p:nvSpPr>
                 <p:cNvPr id="20" name="Text Box 11"/>
@@ -39385,8 +39353,8 @@
             </a:p>
           </p:txBody>
         </p:sp>
-        <mc:AlternateContent xmlns:mc="http://schemas.openxmlformats.org/markup-compatibility/2006">
-          <mc:Choice xmlns:a14="http://schemas.microsoft.com/office/drawing/2010/main" Requires="a14">
+        <mc:AlternateContent xmlns:mc="http://schemas.openxmlformats.org/markup-compatibility/2006" xmlns:a14="http://schemas.microsoft.com/office/drawing/2010/main">
+          <mc:Choice Requires="a14">
             <p:sp>
               <p:nvSpPr>
                 <p:cNvPr id="23" name="Text Box 14"/>
@@ -39561,7 +39529,7 @@
               </p:txBody>
             </p:sp>
           </mc:Choice>
-          <mc:Fallback>
+          <mc:Fallback xmlns="">
             <p:sp>
               <p:nvSpPr>
                 <p:cNvPr id="23" name="Text Box 14"/>

</xml_diff>